<commit_message>
Update Model OOP diagram with Items and Reservations
</commit_message>
<xml_diff>
--- a/docs/diagrams/ModelComponentClassBetterOopDiagram.pptx
+++ b/docs/diagrams/ModelComponentClassBetterOopDiagram.pptx
@@ -208,7 +208,7 @@
           <a:p>
             <a:fld id="{F5CC4B3F-88C1-4FFA-B1B6-F41C21DC6924}" type="datetimeFigureOut">
               <a:rPr lang="en-US" smtClean="0"/>
-              <a:t>10/24/2018</a:t>
+              <a:t>10/29/2018</a:t>
             </a:fld>
             <a:endParaRPr lang="en-US"/>
           </a:p>
@@ -654,7 +654,7 @@
           <a:p>
             <a:fld id="{78C97017-6FC3-485B-9764-EAC9E56C1D49}" type="datetimeFigureOut">
               <a:rPr lang="en-US" smtClean="0"/>
-              <a:t>10/24/2018</a:t>
+              <a:t>10/29/2018</a:t>
             </a:fld>
             <a:endParaRPr lang="en-US"/>
           </a:p>
@@ -822,7 +822,7 @@
           <a:p>
             <a:fld id="{78C97017-6FC3-485B-9764-EAC9E56C1D49}" type="datetimeFigureOut">
               <a:rPr lang="en-US" smtClean="0"/>
-              <a:t>10/24/2018</a:t>
+              <a:t>10/29/2018</a:t>
             </a:fld>
             <a:endParaRPr lang="en-US"/>
           </a:p>
@@ -1000,7 +1000,7 @@
           <a:p>
             <a:fld id="{78C97017-6FC3-485B-9764-EAC9E56C1D49}" type="datetimeFigureOut">
               <a:rPr lang="en-US" smtClean="0"/>
-              <a:t>10/24/2018</a:t>
+              <a:t>10/29/2018</a:t>
             </a:fld>
             <a:endParaRPr lang="en-US"/>
           </a:p>
@@ -1168,7 +1168,7 @@
           <a:p>
             <a:fld id="{78C97017-6FC3-485B-9764-EAC9E56C1D49}" type="datetimeFigureOut">
               <a:rPr lang="en-US" smtClean="0"/>
-              <a:t>10/24/2018</a:t>
+              <a:t>10/29/2018</a:t>
             </a:fld>
             <a:endParaRPr lang="en-US"/>
           </a:p>
@@ -1413,7 +1413,7 @@
           <a:p>
             <a:fld id="{78C97017-6FC3-485B-9764-EAC9E56C1D49}" type="datetimeFigureOut">
               <a:rPr lang="en-US" smtClean="0"/>
-              <a:t>10/24/2018</a:t>
+              <a:t>10/29/2018</a:t>
             </a:fld>
             <a:endParaRPr lang="en-US"/>
           </a:p>
@@ -1698,7 +1698,7 @@
           <a:p>
             <a:fld id="{78C97017-6FC3-485B-9764-EAC9E56C1D49}" type="datetimeFigureOut">
               <a:rPr lang="en-US" smtClean="0"/>
-              <a:t>10/24/2018</a:t>
+              <a:t>10/29/2018</a:t>
             </a:fld>
             <a:endParaRPr lang="en-US"/>
           </a:p>
@@ -2117,7 +2117,7 @@
           <a:p>
             <a:fld id="{78C97017-6FC3-485B-9764-EAC9E56C1D49}" type="datetimeFigureOut">
               <a:rPr lang="en-US" smtClean="0"/>
-              <a:t>10/24/2018</a:t>
+              <a:t>10/29/2018</a:t>
             </a:fld>
             <a:endParaRPr lang="en-US"/>
           </a:p>
@@ -2234,7 +2234,7 @@
           <a:p>
             <a:fld id="{78C97017-6FC3-485B-9764-EAC9E56C1D49}" type="datetimeFigureOut">
               <a:rPr lang="en-US" smtClean="0"/>
-              <a:t>10/24/2018</a:t>
+              <a:t>10/29/2018</a:t>
             </a:fld>
             <a:endParaRPr lang="en-US"/>
           </a:p>
@@ -2329,7 +2329,7 @@
           <a:p>
             <a:fld id="{78C97017-6FC3-485B-9764-EAC9E56C1D49}" type="datetimeFigureOut">
               <a:rPr lang="en-US" smtClean="0"/>
-              <a:t>10/24/2018</a:t>
+              <a:t>10/29/2018</a:t>
             </a:fld>
             <a:endParaRPr lang="en-US"/>
           </a:p>
@@ -2604,7 +2604,7 @@
           <a:p>
             <a:fld id="{78C97017-6FC3-485B-9764-EAC9E56C1D49}" type="datetimeFigureOut">
               <a:rPr lang="en-US" smtClean="0"/>
-              <a:t>10/24/2018</a:t>
+              <a:t>10/29/2018</a:t>
             </a:fld>
             <a:endParaRPr lang="en-US"/>
           </a:p>
@@ -2856,7 +2856,7 @@
           <a:p>
             <a:fld id="{78C97017-6FC3-485B-9764-EAC9E56C1D49}" type="datetimeFigureOut">
               <a:rPr lang="en-US" smtClean="0"/>
-              <a:t>10/24/2018</a:t>
+              <a:t>10/29/2018</a:t>
             </a:fld>
             <a:endParaRPr lang="en-US"/>
           </a:p>
@@ -3067,7 +3067,7 @@
           <a:p>
             <a:fld id="{78C97017-6FC3-485B-9764-EAC9E56C1D49}" type="datetimeFigureOut">
               <a:rPr lang="en-US" smtClean="0"/>
-              <a:t>10/24/2018</a:t>
+              <a:t>10/29/2018</a:t>
             </a:fld>
             <a:endParaRPr lang="en-US"/>
           </a:p>
@@ -3450,7 +3450,7 @@
         </p:nvSpPr>
         <p:spPr>
           <a:xfrm>
-            <a:off x="762000" y="1676400"/>
+            <a:off x="773902" y="-1502326"/>
             <a:ext cx="8305799" cy="3059747"/>
           </a:xfrm>
           <a:prstGeom prst="roundRect">
@@ -3632,13 +3632,13 @@
           <p:nvPr/>
         </p:nvCxnSpPr>
         <p:spPr>
-          <a:xfrm rot="5400000" flipH="1" flipV="1">
-            <a:off x="4340815" y="1072376"/>
-            <a:ext cx="613122" cy="4878021"/>
+          <a:xfrm rot="16200000" flipH="1">
+            <a:off x="4348386" y="1677927"/>
+            <a:ext cx="632640" cy="4912681"/>
           </a:xfrm>
           <a:prstGeom prst="bentConnector3">
             <a:avLst>
-              <a:gd name="adj1" fmla="val -15472"/>
+              <a:gd name="adj1" fmla="val 206020"/>
             </a:avLst>
           </a:prstGeom>
           <a:ln w="19050">
@@ -4104,7 +4104,7 @@
         </p:nvSpPr>
         <p:spPr>
           <a:xfrm>
-            <a:off x="5104626" y="2863434"/>
+            <a:off x="5139286" y="4109196"/>
             <a:ext cx="1232451" cy="346760"/>
           </a:xfrm>
           <a:prstGeom prst="rect">
@@ -4204,15 +4204,15 @@
           <p:cNvPr id="30" name="Elbow Connector 29"/>
           <p:cNvCxnSpPr>
             <a:cxnSpLocks/>
-            <a:stCxn id="54" idx="0"/>
+            <a:stCxn id="51" idx="2"/>
             <a:endCxn id="49" idx="1"/>
           </p:cNvCxnSpPr>
           <p:nvPr/>
         </p:nvCxnSpPr>
         <p:spPr>
-          <a:xfrm rot="5400000" flipH="1" flipV="1">
-            <a:off x="4953714" y="2915275"/>
-            <a:ext cx="29373" cy="272452"/>
+          <a:xfrm rot="16200000" flipH="1">
+            <a:off x="4351313" y="3494602"/>
+            <a:ext cx="1150811" cy="425136"/>
           </a:xfrm>
           <a:prstGeom prst="bentConnector2">
             <a:avLst/>
@@ -4249,7 +4249,7 @@
         </p:nvSpPr>
         <p:spPr>
           <a:xfrm>
-            <a:off x="6732294" y="2858066"/>
+            <a:off x="6766954" y="4103828"/>
             <a:ext cx="708186" cy="346760"/>
           </a:xfrm>
           <a:prstGeom prst="rect">
@@ -4305,7 +4305,7 @@
         </p:nvSpPr>
         <p:spPr>
           <a:xfrm>
-            <a:off x="6337077" y="2941065"/>
+            <a:off x="6371737" y="4186827"/>
             <a:ext cx="236048" cy="173380"/>
           </a:xfrm>
           <a:prstGeom prst="flowChartDecision">
@@ -4354,7 +4354,7 @@
         </p:nvCxnSpPr>
         <p:spPr>
           <a:xfrm>
-            <a:off x="6573125" y="3027755"/>
+            <a:off x="6607785" y="4273517"/>
             <a:ext cx="159169" cy="3691"/>
           </a:xfrm>
           <a:prstGeom prst="bentConnector3">
@@ -4392,8 +4392,8 @@
         </p:nvSpPr>
         <p:spPr>
           <a:xfrm>
-            <a:off x="8131013" y="2564238"/>
-            <a:ext cx="825927" cy="285783"/>
+            <a:off x="8232145" y="3733800"/>
+            <a:ext cx="1284214" cy="285783"/>
           </a:xfrm>
           <a:prstGeom prst="rect">
             <a:avLst/>
@@ -4448,7 +4448,7 @@
         </p:nvSpPr>
         <p:spPr>
           <a:xfrm>
-            <a:off x="7460564" y="2948201"/>
+            <a:off x="7495224" y="4193963"/>
             <a:ext cx="236048" cy="173380"/>
           </a:xfrm>
           <a:prstGeom prst="flowChartDecision">
@@ -4492,13 +4492,15 @@
           <p:cNvPr id="79" name="Elbow Connector 78"/>
           <p:cNvCxnSpPr>
             <a:cxnSpLocks/>
+            <a:stCxn id="78" idx="3"/>
+            <a:endCxn id="76" idx="1"/>
           </p:cNvCxnSpPr>
           <p:nvPr/>
         </p:nvCxnSpPr>
         <p:spPr>
           <a:xfrm flipV="1">
-            <a:off x="7696612" y="2706821"/>
-            <a:ext cx="434402" cy="327761"/>
+            <a:off x="7731272" y="3876692"/>
+            <a:ext cx="500873" cy="403961"/>
           </a:xfrm>
           <a:prstGeom prst="bentConnector3">
             <a:avLst/>
@@ -4535,8 +4537,8 @@
         </p:nvSpPr>
         <p:spPr>
           <a:xfrm>
-            <a:off x="8131013" y="2887216"/>
-            <a:ext cx="823381" cy="285783"/>
+            <a:off x="8232145" y="4078364"/>
+            <a:ext cx="1284214" cy="285783"/>
           </a:xfrm>
           <a:prstGeom prst="rect">
             <a:avLst/>
@@ -4588,16 +4590,20 @@
           <p:cNvPr id="81" name="Elbow Connector 80"/>
           <p:cNvCxnSpPr>
             <a:cxnSpLocks/>
+            <a:stCxn id="78" idx="3"/>
+            <a:endCxn id="80" idx="1"/>
           </p:cNvCxnSpPr>
           <p:nvPr/>
         </p:nvCxnSpPr>
         <p:spPr>
           <a:xfrm flipV="1">
-            <a:off x="7701314" y="3029799"/>
-            <a:ext cx="434401" cy="4783"/>
+            <a:off x="7731272" y="4221256"/>
+            <a:ext cx="500873" cy="59397"/>
           </a:xfrm>
           <a:prstGeom prst="bentConnector3">
-            <a:avLst/>
+            <a:avLst>
+              <a:gd name="adj1" fmla="val 50000"/>
+            </a:avLst>
           </a:prstGeom>
           <a:ln w="19050">
             <a:solidFill>
@@ -4631,7 +4637,7 @@
         </p:nvSpPr>
         <p:spPr>
           <a:xfrm rot="16200000">
-            <a:off x="6786891" y="3504290"/>
+            <a:off x="6821551" y="4750052"/>
             <a:ext cx="881018" cy="261610"/>
           </a:xfrm>
           <a:prstGeom prst="rect">
@@ -4670,7 +4676,7 @@
         </p:nvSpPr>
         <p:spPr>
           <a:xfrm>
-            <a:off x="2057401" y="4239491"/>
+            <a:off x="969619" y="4358115"/>
             <a:ext cx="1066800" cy="346760"/>
           </a:xfrm>
           <a:prstGeom prst="rect">
@@ -4737,18 +4743,21 @@
         <p:nvCxnSpPr>
           <p:cNvPr id="124" name="Elbow Connector 122"/>
           <p:cNvCxnSpPr>
+            <a:cxnSpLocks/>
             <a:stCxn id="119" idx="1"/>
-            <a:endCxn id="122" idx="1"/>
+            <a:endCxn id="122" idx="0"/>
           </p:cNvCxnSpPr>
           <p:nvPr/>
         </p:nvCxnSpPr>
         <p:spPr>
-          <a:xfrm rot="16200000" flipH="1">
-            <a:off x="1364475" y="3719944"/>
-            <a:ext cx="831471" cy="554381"/>
-          </a:xfrm>
-          <a:prstGeom prst="bentConnector2">
-            <a:avLst/>
+          <a:xfrm rot="5400000">
+            <a:off x="1114663" y="3969757"/>
+            <a:ext cx="776715" cy="1"/>
+          </a:xfrm>
+          <a:prstGeom prst="bentConnector3">
+            <a:avLst>
+              <a:gd name="adj1" fmla="val 50000"/>
+            </a:avLst>
           </a:prstGeom>
           <a:ln w="19050">
             <a:solidFill>
@@ -4783,7 +4792,7 @@
         </p:nvSpPr>
         <p:spPr>
           <a:xfrm>
-            <a:off x="4737545" y="3066187"/>
+            <a:off x="4870444" y="4006441"/>
             <a:ext cx="189257" cy="178683"/>
           </a:xfrm>
           <a:prstGeom prst="rect">
@@ -4822,7 +4831,7 @@
         </p:nvSpPr>
         <p:spPr>
           <a:xfrm>
-            <a:off x="6553873" y="3097917"/>
+            <a:off x="6588533" y="4343679"/>
             <a:ext cx="189257" cy="178683"/>
           </a:xfrm>
           <a:prstGeom prst="rect">
@@ -4939,7 +4948,7 @@
         </p:nvSpPr>
         <p:spPr>
           <a:xfrm>
-            <a:off x="6868513" y="3204826"/>
+            <a:off x="6903173" y="4450588"/>
             <a:ext cx="189257" cy="178683"/>
           </a:xfrm>
           <a:prstGeom prst="rect">
@@ -4984,7 +4993,7 @@
         </p:nvSpPr>
         <p:spPr>
           <a:xfrm>
-            <a:off x="5098289" y="2206861"/>
+            <a:off x="5098289" y="1956840"/>
             <a:ext cx="1204608" cy="285783"/>
           </a:xfrm>
           <a:prstGeom prst="rect">
@@ -5050,8 +5059,8 @@
         </p:nvCxnSpPr>
         <p:spPr>
           <a:xfrm rot="5400000" flipH="1" flipV="1">
-            <a:off x="4601903" y="2462000"/>
-            <a:ext cx="608632" cy="384139"/>
+            <a:off x="4476893" y="2336990"/>
+            <a:ext cx="858653" cy="384139"/>
           </a:xfrm>
           <a:prstGeom prst="bentConnector2">
             <a:avLst/>
@@ -5098,8 +5107,8 @@
         </p:nvCxnSpPr>
         <p:spPr>
           <a:xfrm>
-            <a:off x="6565994" y="2348771"/>
-            <a:ext cx="166300" cy="73"/>
+            <a:off x="6565994" y="2098750"/>
+            <a:ext cx="455368" cy="73"/>
           </a:xfrm>
           <a:prstGeom prst="bentConnector3">
             <a:avLst/>
@@ -5142,7 +5151,7 @@
         </p:nvSpPr>
         <p:spPr>
           <a:xfrm>
-            <a:off x="6732294" y="2175464"/>
+            <a:off x="7021362" y="1925443"/>
             <a:ext cx="708186" cy="346760"/>
           </a:xfrm>
           <a:prstGeom prst="rect">
@@ -5204,7 +5213,7 @@
         </p:nvSpPr>
         <p:spPr>
           <a:xfrm>
-            <a:off x="6489577" y="2155021"/>
+            <a:off x="6604331" y="1932811"/>
             <a:ext cx="232097" cy="188684"/>
           </a:xfrm>
           <a:prstGeom prst="rect">
@@ -5249,7 +5258,7 @@
         </p:nvSpPr>
         <p:spPr>
           <a:xfrm>
-            <a:off x="4709517" y="2172972"/>
+            <a:off x="4771059" y="2174550"/>
             <a:ext cx="189257" cy="178683"/>
           </a:xfrm>
           <a:prstGeom prst="rect">
@@ -5294,7 +5303,7 @@
         </p:nvSpPr>
         <p:spPr>
           <a:xfrm>
-            <a:off x="6329946" y="2262081"/>
+            <a:off x="6329946" y="2012060"/>
             <a:ext cx="236048" cy="173380"/>
           </a:xfrm>
           <a:prstGeom prst="flowChartDecision">
@@ -5647,6 +5656,1943 @@
           </a:fontRef>
         </p:style>
       </p:cxnSp>
+      <p:cxnSp>
+        <p:nvCxnSpPr>
+          <p:cNvPr id="97" name="Elbow Connector 29">
+            <a:extLst>
+              <a:ext uri="{FF2B5EF4-FFF2-40B4-BE49-F238E27FC236}">
+                <a16:creationId xmlns:a16="http://schemas.microsoft.com/office/drawing/2014/main" id="{0CD47463-7800-49D6-B64C-D018AFC08728}"/>
+              </a:ext>
+            </a:extLst>
+          </p:cNvPr>
+          <p:cNvCxnSpPr>
+            <a:cxnSpLocks/>
+            <a:endCxn id="98" idx="1"/>
+          </p:cNvCxnSpPr>
+          <p:nvPr/>
+        </p:nvCxnSpPr>
+        <p:spPr>
+          <a:xfrm>
+            <a:off x="4805374" y="3044718"/>
+            <a:ext cx="289135" cy="3010"/>
+          </a:xfrm>
+          <a:prstGeom prst="bentConnector3">
+            <a:avLst/>
+          </a:prstGeom>
+          <a:ln w="19050">
+            <a:solidFill>
+              <a:srgbClr val="7030A0"/>
+            </a:solidFill>
+            <a:headEnd type="none" w="med" len="med"/>
+            <a:tailEnd type="arrow" w="med" len="med"/>
+          </a:ln>
+          <a:effectLst/>
+        </p:spPr>
+        <p:style>
+          <a:lnRef idx="1">
+            <a:schemeClr val="accent2"/>
+          </a:lnRef>
+          <a:fillRef idx="2">
+            <a:schemeClr val="accent2"/>
+          </a:fillRef>
+          <a:effectRef idx="1">
+            <a:schemeClr val="accent2"/>
+          </a:effectRef>
+          <a:fontRef idx="minor">
+            <a:schemeClr val="dk1"/>
+          </a:fontRef>
+        </p:style>
+      </p:cxnSp>
+      <p:sp>
+        <p:nvSpPr>
+          <p:cNvPr id="98" name="Rectangle 8">
+            <a:extLst>
+              <a:ext uri="{FF2B5EF4-FFF2-40B4-BE49-F238E27FC236}">
+                <a16:creationId xmlns:a16="http://schemas.microsoft.com/office/drawing/2014/main" id="{99CADC52-CEEB-4E83-B009-82EA36CD9C88}"/>
+              </a:ext>
+            </a:extLst>
+          </p:cNvPr>
+          <p:cNvSpPr/>
+          <p:nvPr/>
+        </p:nvSpPr>
+        <p:spPr>
+          <a:xfrm>
+            <a:off x="5094509" y="2874348"/>
+            <a:ext cx="1156969" cy="346760"/>
+          </a:xfrm>
+          <a:prstGeom prst="rect">
+            <a:avLst/>
+          </a:prstGeom>
+          <a:ln w="19050">
+            <a:solidFill>
+              <a:srgbClr val="7030A0"/>
+            </a:solidFill>
+          </a:ln>
+          <a:effectLst/>
+        </p:spPr>
+        <p:style>
+          <a:lnRef idx="1">
+            <a:schemeClr val="accent4"/>
+          </a:lnRef>
+          <a:fillRef idx="2">
+            <a:schemeClr val="accent4"/>
+          </a:fillRef>
+          <a:effectRef idx="1">
+            <a:schemeClr val="accent4"/>
+          </a:effectRef>
+          <a:fontRef idx="minor">
+            <a:schemeClr val="dk1"/>
+          </a:fontRef>
+        </p:style>
+        <p:txBody>
+          <a:bodyPr rtlCol="0" anchor="ctr"/>
+          <a:lstStyle/>
+          <a:p>
+            <a:pPr algn="ctr"/>
+            <a:r>
+              <a:rPr lang="en-US" sz="1050" dirty="0" err="1">
+                <a:solidFill>
+                  <a:srgbClr val="7030A0"/>
+                </a:solidFill>
+              </a:rPr>
+              <a:t>UniqueItemList</a:t>
+            </a:r>
+            <a:endParaRPr lang="en-SG" sz="1050" dirty="0">
+              <a:solidFill>
+                <a:srgbClr val="7030A0"/>
+              </a:solidFill>
+            </a:endParaRPr>
+          </a:p>
+        </p:txBody>
+      </p:sp>
+      <p:sp>
+        <p:nvSpPr>
+          <p:cNvPr id="101" name="Flowchart: Decision 96">
+            <a:extLst>
+              <a:ext uri="{FF2B5EF4-FFF2-40B4-BE49-F238E27FC236}">
+                <a16:creationId xmlns:a16="http://schemas.microsoft.com/office/drawing/2014/main" id="{DBBBB042-7B03-4CD1-AC3F-74CB62EED2DC}"/>
+              </a:ext>
+            </a:extLst>
+          </p:cNvPr>
+          <p:cNvSpPr/>
+          <p:nvPr/>
+        </p:nvSpPr>
+        <p:spPr>
+          <a:xfrm>
+            <a:off x="6248400" y="2941065"/>
+            <a:ext cx="236048" cy="173380"/>
+          </a:xfrm>
+          <a:prstGeom prst="flowChartDecision">
+            <a:avLst/>
+          </a:prstGeom>
+          <a:noFill/>
+          <a:ln w="19050">
+            <a:solidFill>
+              <a:srgbClr val="7030A0"/>
+            </a:solidFill>
+          </a:ln>
+          <a:effectLst/>
+        </p:spPr>
+        <p:style>
+          <a:lnRef idx="1">
+            <a:schemeClr val="accent6"/>
+          </a:lnRef>
+          <a:fillRef idx="2">
+            <a:schemeClr val="accent6"/>
+          </a:fillRef>
+          <a:effectRef idx="1">
+            <a:schemeClr val="accent6"/>
+          </a:effectRef>
+          <a:fontRef idx="minor">
+            <a:schemeClr val="dk1"/>
+          </a:fontRef>
+        </p:style>
+        <p:txBody>
+          <a:bodyPr rtlCol="0" anchor="ctr"/>
+          <a:lstStyle/>
+          <a:p>
+            <a:pPr algn="ctr"/>
+            <a:endParaRPr lang="en-US" sz="1050"/>
+          </a:p>
+        </p:txBody>
+      </p:sp>
+      <p:sp>
+        <p:nvSpPr>
+          <p:cNvPr id="102" name="TextBox 101">
+            <a:extLst>
+              <a:ext uri="{FF2B5EF4-FFF2-40B4-BE49-F238E27FC236}">
+                <a16:creationId xmlns:a16="http://schemas.microsoft.com/office/drawing/2014/main" id="{7BC0C562-7AE8-468F-B529-859A84E9D90D}"/>
+              </a:ext>
+            </a:extLst>
+          </p:cNvPr>
+          <p:cNvSpPr txBox="1"/>
+          <p:nvPr/>
+        </p:nvSpPr>
+        <p:spPr>
+          <a:xfrm>
+            <a:off x="6465196" y="3097917"/>
+            <a:ext cx="189257" cy="178683"/>
+          </a:xfrm>
+          <a:prstGeom prst="rect">
+            <a:avLst/>
+          </a:prstGeom>
+          <a:noFill/>
+        </p:spPr>
+        <p:txBody>
+          <a:bodyPr wrap="square" lIns="0" tIns="0" rIns="0" bIns="0" rtlCol="0">
+            <a:noAutofit/>
+          </a:bodyPr>
+          <a:lstStyle/>
+          <a:p>
+            <a:pPr algn="ctr"/>
+            <a:r>
+              <a:rPr lang="en-US" sz="1100" dirty="0">
+                <a:solidFill>
+                  <a:srgbClr val="7030A0"/>
+                </a:solidFill>
+              </a:rPr>
+              <a:t>*</a:t>
+            </a:r>
+            <a:endParaRPr lang="en-SG" sz="1100" dirty="0">
+              <a:solidFill>
+                <a:srgbClr val="7030A0"/>
+              </a:solidFill>
+            </a:endParaRPr>
+          </a:p>
+        </p:txBody>
+      </p:sp>
+      <p:cxnSp>
+        <p:nvCxnSpPr>
+          <p:cNvPr id="103" name="Elbow Connector 63">
+            <a:extLst>
+              <a:ext uri="{FF2B5EF4-FFF2-40B4-BE49-F238E27FC236}">
+                <a16:creationId xmlns:a16="http://schemas.microsoft.com/office/drawing/2014/main" id="{5B09AC77-5AD5-4D25-B313-807331ED0769}"/>
+              </a:ext>
+            </a:extLst>
+          </p:cNvPr>
+          <p:cNvCxnSpPr>
+            <a:cxnSpLocks/>
+          </p:cNvCxnSpPr>
+          <p:nvPr/>
+        </p:nvCxnSpPr>
+        <p:spPr>
+          <a:xfrm>
+            <a:off x="6470231" y="3027755"/>
+            <a:ext cx="159169" cy="3691"/>
+          </a:xfrm>
+          <a:prstGeom prst="bentConnector3">
+            <a:avLst/>
+          </a:prstGeom>
+          <a:ln w="19050">
+            <a:solidFill>
+              <a:srgbClr val="7030A0"/>
+            </a:solidFill>
+            <a:headEnd type="none" w="med" len="med"/>
+            <a:tailEnd type="arrow" w="med" len="med"/>
+          </a:ln>
+          <a:effectLst/>
+        </p:spPr>
+        <p:style>
+          <a:lnRef idx="1">
+            <a:schemeClr val="accent2"/>
+          </a:lnRef>
+          <a:fillRef idx="2">
+            <a:schemeClr val="accent2"/>
+          </a:fillRef>
+          <a:effectRef idx="1">
+            <a:schemeClr val="accent2"/>
+          </a:effectRef>
+          <a:fontRef idx="minor">
+            <a:schemeClr val="dk1"/>
+          </a:fontRef>
+        </p:style>
+      </p:cxnSp>
+      <p:sp>
+        <p:nvSpPr>
+          <p:cNvPr id="104" name="Rectangle 8">
+            <a:extLst>
+              <a:ext uri="{FF2B5EF4-FFF2-40B4-BE49-F238E27FC236}">
+                <a16:creationId xmlns:a16="http://schemas.microsoft.com/office/drawing/2014/main" id="{518C4135-3F61-482B-A84A-E0B22054CCB6}"/>
+              </a:ext>
+            </a:extLst>
+          </p:cNvPr>
+          <p:cNvSpPr/>
+          <p:nvPr/>
+        </p:nvSpPr>
+        <p:spPr>
+          <a:xfrm>
+            <a:off x="6637793" y="2868600"/>
+            <a:ext cx="708186" cy="346760"/>
+          </a:xfrm>
+          <a:prstGeom prst="rect">
+            <a:avLst/>
+          </a:prstGeom>
+          <a:ln w="19050">
+            <a:solidFill>
+              <a:srgbClr val="7030A0"/>
+            </a:solidFill>
+          </a:ln>
+          <a:effectLst/>
+        </p:spPr>
+        <p:style>
+          <a:lnRef idx="1">
+            <a:schemeClr val="accent4"/>
+          </a:lnRef>
+          <a:fillRef idx="2">
+            <a:schemeClr val="accent4"/>
+          </a:fillRef>
+          <a:effectRef idx="1">
+            <a:schemeClr val="accent4"/>
+          </a:effectRef>
+          <a:fontRef idx="minor">
+            <a:schemeClr val="dk1"/>
+          </a:fontRef>
+        </p:style>
+        <p:txBody>
+          <a:bodyPr rtlCol="0" anchor="ctr"/>
+          <a:lstStyle/>
+          <a:p>
+            <a:pPr algn="ctr"/>
+            <a:r>
+              <a:rPr lang="en-US" sz="1050" dirty="0">
+                <a:solidFill>
+                  <a:srgbClr val="7030A0"/>
+                </a:solidFill>
+              </a:rPr>
+              <a:t>Item</a:t>
+            </a:r>
+            <a:endParaRPr lang="en-SG" sz="1050" dirty="0">
+              <a:solidFill>
+                <a:srgbClr val="7030A0"/>
+              </a:solidFill>
+            </a:endParaRPr>
+          </a:p>
+        </p:txBody>
+      </p:sp>
+      <p:sp>
+        <p:nvSpPr>
+          <p:cNvPr id="105" name="TextBox 104">
+            <a:extLst>
+              <a:ext uri="{FF2B5EF4-FFF2-40B4-BE49-F238E27FC236}">
+                <a16:creationId xmlns:a16="http://schemas.microsoft.com/office/drawing/2014/main" id="{E9AFB592-949D-4167-AA85-DF7F4F360D6A}"/>
+              </a:ext>
+            </a:extLst>
+          </p:cNvPr>
+          <p:cNvSpPr txBox="1"/>
+          <p:nvPr/>
+        </p:nvSpPr>
+        <p:spPr>
+          <a:xfrm>
+            <a:off x="7026079" y="2200459"/>
+            <a:ext cx="189257" cy="178683"/>
+          </a:xfrm>
+          <a:prstGeom prst="rect">
+            <a:avLst/>
+          </a:prstGeom>
+          <a:noFill/>
+        </p:spPr>
+        <p:txBody>
+          <a:bodyPr wrap="square" lIns="0" tIns="0" rIns="0" bIns="0" rtlCol="0">
+            <a:noAutofit/>
+          </a:bodyPr>
+          <a:lstStyle/>
+          <a:p>
+            <a:pPr algn="ctr"/>
+            <a:r>
+              <a:rPr lang="en-US" sz="1100" dirty="0">
+                <a:solidFill>
+                  <a:srgbClr val="7030A0"/>
+                </a:solidFill>
+              </a:rPr>
+              <a:t>*</a:t>
+            </a:r>
+            <a:endParaRPr lang="en-SG" sz="1100" dirty="0">
+              <a:solidFill>
+                <a:srgbClr val="7030A0"/>
+              </a:solidFill>
+            </a:endParaRPr>
+          </a:p>
+        </p:txBody>
+      </p:sp>
+      <p:sp>
+        <p:nvSpPr>
+          <p:cNvPr id="106" name="Flowchart: Decision 96">
+            <a:extLst>
+              <a:ext uri="{FF2B5EF4-FFF2-40B4-BE49-F238E27FC236}">
+                <a16:creationId xmlns:a16="http://schemas.microsoft.com/office/drawing/2014/main" id="{32D79EEE-EEC8-4235-BF86-CA70742E3E08}"/>
+              </a:ext>
+            </a:extLst>
+          </p:cNvPr>
+          <p:cNvSpPr/>
+          <p:nvPr/>
+        </p:nvSpPr>
+        <p:spPr>
+          <a:xfrm rot="16200000">
+            <a:off x="6865001" y="2639993"/>
+            <a:ext cx="236048" cy="173380"/>
+          </a:xfrm>
+          <a:prstGeom prst="flowChartDecision">
+            <a:avLst/>
+          </a:prstGeom>
+          <a:noFill/>
+          <a:ln w="19050">
+            <a:solidFill>
+              <a:srgbClr val="7030A0"/>
+            </a:solidFill>
+          </a:ln>
+          <a:effectLst/>
+        </p:spPr>
+        <p:style>
+          <a:lnRef idx="1">
+            <a:schemeClr val="accent6"/>
+          </a:lnRef>
+          <a:fillRef idx="2">
+            <a:schemeClr val="accent6"/>
+          </a:fillRef>
+          <a:effectRef idx="1">
+            <a:schemeClr val="accent6"/>
+          </a:effectRef>
+          <a:fontRef idx="minor">
+            <a:schemeClr val="dk1"/>
+          </a:fontRef>
+        </p:style>
+        <p:txBody>
+          <a:bodyPr rtlCol="0" anchor="ctr"/>
+          <a:lstStyle/>
+          <a:p>
+            <a:pPr algn="ctr"/>
+            <a:endParaRPr lang="en-US" sz="1050"/>
+          </a:p>
+        </p:txBody>
+      </p:sp>
+      <p:cxnSp>
+        <p:nvCxnSpPr>
+          <p:cNvPr id="108" name="Elbow Connector 78">
+            <a:extLst>
+              <a:ext uri="{FF2B5EF4-FFF2-40B4-BE49-F238E27FC236}">
+                <a16:creationId xmlns:a16="http://schemas.microsoft.com/office/drawing/2014/main" id="{F5FA200F-240F-4C93-B7F0-B8C9F787D2B4}"/>
+              </a:ext>
+            </a:extLst>
+          </p:cNvPr>
+          <p:cNvCxnSpPr>
+            <a:cxnSpLocks/>
+            <a:stCxn id="106" idx="3"/>
+            <a:endCxn id="67" idx="2"/>
+          </p:cNvCxnSpPr>
+          <p:nvPr/>
+        </p:nvCxnSpPr>
+        <p:spPr>
+          <a:xfrm rot="5400000" flipH="1" flipV="1">
+            <a:off x="7011012" y="2244216"/>
+            <a:ext cx="336456" cy="392430"/>
+          </a:xfrm>
+          <a:prstGeom prst="bentConnector3">
+            <a:avLst>
+              <a:gd name="adj1" fmla="val 50000"/>
+            </a:avLst>
+          </a:prstGeom>
+          <a:ln w="19050">
+            <a:solidFill>
+              <a:srgbClr val="7030A0"/>
+            </a:solidFill>
+            <a:headEnd type="none" w="med" len="med"/>
+            <a:tailEnd type="arrow" w="med" len="med"/>
+          </a:ln>
+          <a:effectLst/>
+        </p:spPr>
+        <p:style>
+          <a:lnRef idx="1">
+            <a:schemeClr val="accent2"/>
+          </a:lnRef>
+          <a:fillRef idx="2">
+            <a:schemeClr val="accent2"/>
+          </a:fillRef>
+          <a:effectRef idx="1">
+            <a:schemeClr val="accent2"/>
+          </a:effectRef>
+          <a:fontRef idx="minor">
+            <a:schemeClr val="dk1"/>
+          </a:fontRef>
+        </p:style>
+      </p:cxnSp>
+      <p:sp>
+        <p:nvSpPr>
+          <p:cNvPr id="109" name="Flowchart: Decision 96">
+            <a:extLst>
+              <a:ext uri="{FF2B5EF4-FFF2-40B4-BE49-F238E27FC236}">
+                <a16:creationId xmlns:a16="http://schemas.microsoft.com/office/drawing/2014/main" id="{35A07907-B046-4315-B72E-EF51E4EA398E}"/>
+              </a:ext>
+            </a:extLst>
+          </p:cNvPr>
+          <p:cNvSpPr/>
+          <p:nvPr/>
+        </p:nvSpPr>
+        <p:spPr>
+          <a:xfrm>
+            <a:off x="7351576" y="2975664"/>
+            <a:ext cx="236048" cy="173380"/>
+          </a:xfrm>
+          <a:prstGeom prst="flowChartDecision">
+            <a:avLst/>
+          </a:prstGeom>
+          <a:solidFill>
+            <a:srgbClr val="7030A0"/>
+          </a:solidFill>
+          <a:ln w="19050">
+            <a:solidFill>
+              <a:srgbClr val="7030A0"/>
+            </a:solidFill>
+          </a:ln>
+          <a:effectLst/>
+        </p:spPr>
+        <p:style>
+          <a:lnRef idx="1">
+            <a:schemeClr val="accent6"/>
+          </a:lnRef>
+          <a:fillRef idx="2">
+            <a:schemeClr val="accent6"/>
+          </a:fillRef>
+          <a:effectRef idx="1">
+            <a:schemeClr val="accent6"/>
+          </a:effectRef>
+          <a:fontRef idx="minor">
+            <a:schemeClr val="dk1"/>
+          </a:fontRef>
+        </p:style>
+        <p:txBody>
+          <a:bodyPr rtlCol="0" anchor="ctr"/>
+          <a:lstStyle/>
+          <a:p>
+            <a:pPr algn="ctr"/>
+            <a:endParaRPr lang="en-US" sz="1050"/>
+          </a:p>
+        </p:txBody>
+      </p:sp>
+      <p:cxnSp>
+        <p:nvCxnSpPr>
+          <p:cNvPr id="110" name="Elbow Connector 78">
+            <a:extLst>
+              <a:ext uri="{FF2B5EF4-FFF2-40B4-BE49-F238E27FC236}">
+                <a16:creationId xmlns:a16="http://schemas.microsoft.com/office/drawing/2014/main" id="{A087A695-DAB3-4BAF-8CD8-A05F27CA3C1E}"/>
+              </a:ext>
+            </a:extLst>
+          </p:cNvPr>
+          <p:cNvCxnSpPr>
+            <a:cxnSpLocks/>
+            <a:stCxn id="109" idx="3"/>
+            <a:endCxn id="116" idx="1"/>
+          </p:cNvCxnSpPr>
+          <p:nvPr/>
+        </p:nvCxnSpPr>
+        <p:spPr>
+          <a:xfrm flipV="1">
+            <a:off x="7587624" y="2345564"/>
+            <a:ext cx="644521" cy="716790"/>
+          </a:xfrm>
+          <a:prstGeom prst="bentConnector3">
+            <a:avLst>
+              <a:gd name="adj1" fmla="val 50000"/>
+            </a:avLst>
+          </a:prstGeom>
+          <a:ln w="19050">
+            <a:solidFill>
+              <a:srgbClr val="7030A0"/>
+            </a:solidFill>
+            <a:headEnd type="none" w="med" len="med"/>
+            <a:tailEnd type="arrow" w="med" len="med"/>
+          </a:ln>
+          <a:effectLst/>
+        </p:spPr>
+        <p:style>
+          <a:lnRef idx="1">
+            <a:schemeClr val="accent2"/>
+          </a:lnRef>
+          <a:fillRef idx="2">
+            <a:schemeClr val="accent2"/>
+          </a:fillRef>
+          <a:effectRef idx="1">
+            <a:schemeClr val="accent2"/>
+          </a:effectRef>
+          <a:fontRef idx="minor">
+            <a:schemeClr val="dk1"/>
+          </a:fontRef>
+        </p:style>
+      </p:cxnSp>
+      <p:cxnSp>
+        <p:nvCxnSpPr>
+          <p:cNvPr id="111" name="Elbow Connector 80">
+            <a:extLst>
+              <a:ext uri="{FF2B5EF4-FFF2-40B4-BE49-F238E27FC236}">
+                <a16:creationId xmlns:a16="http://schemas.microsoft.com/office/drawing/2014/main" id="{17563622-C113-4694-9F4D-95D1803E43A4}"/>
+              </a:ext>
+            </a:extLst>
+          </p:cNvPr>
+          <p:cNvCxnSpPr>
+            <a:cxnSpLocks/>
+            <a:stCxn id="109" idx="3"/>
+            <a:endCxn id="117" idx="1"/>
+          </p:cNvCxnSpPr>
+          <p:nvPr/>
+        </p:nvCxnSpPr>
+        <p:spPr>
+          <a:xfrm flipV="1">
+            <a:off x="7587624" y="2675370"/>
+            <a:ext cx="644521" cy="386984"/>
+          </a:xfrm>
+          <a:prstGeom prst="bentConnector3">
+            <a:avLst/>
+          </a:prstGeom>
+          <a:ln w="19050">
+            <a:solidFill>
+              <a:srgbClr val="7030A0"/>
+            </a:solidFill>
+            <a:headEnd type="none" w="med" len="med"/>
+            <a:tailEnd type="arrow" w="med" len="med"/>
+          </a:ln>
+          <a:effectLst/>
+        </p:spPr>
+        <p:style>
+          <a:lnRef idx="1">
+            <a:schemeClr val="accent2"/>
+          </a:lnRef>
+          <a:fillRef idx="2">
+            <a:schemeClr val="accent2"/>
+          </a:fillRef>
+          <a:effectRef idx="1">
+            <a:schemeClr val="accent2"/>
+          </a:effectRef>
+          <a:fontRef idx="minor">
+            <a:schemeClr val="dk1"/>
+          </a:fontRef>
+        </p:style>
+      </p:cxnSp>
+      <p:cxnSp>
+        <p:nvCxnSpPr>
+          <p:cNvPr id="112" name="Elbow Connector 83">
+            <a:extLst>
+              <a:ext uri="{FF2B5EF4-FFF2-40B4-BE49-F238E27FC236}">
+                <a16:creationId xmlns:a16="http://schemas.microsoft.com/office/drawing/2014/main" id="{10A3E88F-EDFF-4103-AC6E-07EEDC7D7502}"/>
+              </a:ext>
+            </a:extLst>
+          </p:cNvPr>
+          <p:cNvCxnSpPr>
+            <a:cxnSpLocks/>
+            <a:stCxn id="109" idx="3"/>
+            <a:endCxn id="121" idx="1"/>
+          </p:cNvCxnSpPr>
+          <p:nvPr/>
+        </p:nvCxnSpPr>
+        <p:spPr>
+          <a:xfrm flipV="1">
+            <a:off x="7587624" y="3011724"/>
+            <a:ext cx="644521" cy="50630"/>
+          </a:xfrm>
+          <a:prstGeom prst="bentConnector3">
+            <a:avLst/>
+          </a:prstGeom>
+          <a:ln w="19050">
+            <a:solidFill>
+              <a:srgbClr val="7030A0"/>
+            </a:solidFill>
+            <a:headEnd type="none" w="med" len="med"/>
+            <a:tailEnd type="arrow" w="med" len="med"/>
+          </a:ln>
+          <a:effectLst/>
+        </p:spPr>
+        <p:style>
+          <a:lnRef idx="1">
+            <a:schemeClr val="accent2"/>
+          </a:lnRef>
+          <a:fillRef idx="2">
+            <a:schemeClr val="accent2"/>
+          </a:fillRef>
+          <a:effectRef idx="1">
+            <a:schemeClr val="accent2"/>
+          </a:effectRef>
+          <a:fontRef idx="minor">
+            <a:schemeClr val="dk1"/>
+          </a:fontRef>
+        </p:style>
+      </p:cxnSp>
+      <p:cxnSp>
+        <p:nvCxnSpPr>
+          <p:cNvPr id="113" name="Elbow Connector 83">
+            <a:extLst>
+              <a:ext uri="{FF2B5EF4-FFF2-40B4-BE49-F238E27FC236}">
+                <a16:creationId xmlns:a16="http://schemas.microsoft.com/office/drawing/2014/main" id="{8D64D27C-F6B2-49B5-B397-3E2EFD8693D9}"/>
+              </a:ext>
+            </a:extLst>
+          </p:cNvPr>
+          <p:cNvCxnSpPr>
+            <a:cxnSpLocks/>
+            <a:stCxn id="109" idx="3"/>
+            <a:endCxn id="123" idx="1"/>
+          </p:cNvCxnSpPr>
+          <p:nvPr/>
+        </p:nvCxnSpPr>
+        <p:spPr>
+          <a:xfrm>
+            <a:off x="7587624" y="3062354"/>
+            <a:ext cx="643195" cy="340421"/>
+          </a:xfrm>
+          <a:prstGeom prst="bentConnector3">
+            <a:avLst>
+              <a:gd name="adj1" fmla="val 50000"/>
+            </a:avLst>
+          </a:prstGeom>
+          <a:ln w="19050">
+            <a:solidFill>
+              <a:srgbClr val="7030A0"/>
+            </a:solidFill>
+            <a:headEnd type="none" w="med" len="med"/>
+            <a:tailEnd type="arrow" w="med" len="med"/>
+          </a:ln>
+          <a:effectLst/>
+        </p:spPr>
+        <p:style>
+          <a:lnRef idx="1">
+            <a:schemeClr val="accent2"/>
+          </a:lnRef>
+          <a:fillRef idx="2">
+            <a:schemeClr val="accent2"/>
+          </a:fillRef>
+          <a:effectRef idx="1">
+            <a:schemeClr val="accent2"/>
+          </a:effectRef>
+          <a:fontRef idx="minor">
+            <a:schemeClr val="dk1"/>
+          </a:fontRef>
+        </p:style>
+      </p:cxnSp>
+      <p:sp>
+        <p:nvSpPr>
+          <p:cNvPr id="115" name="TextBox 114">
+            <a:extLst>
+              <a:ext uri="{FF2B5EF4-FFF2-40B4-BE49-F238E27FC236}">
+                <a16:creationId xmlns:a16="http://schemas.microsoft.com/office/drawing/2014/main" id="{8F33B5A1-216B-448F-B0ED-4F82EE3F992F}"/>
+              </a:ext>
+            </a:extLst>
+          </p:cNvPr>
+          <p:cNvSpPr txBox="1"/>
+          <p:nvPr/>
+        </p:nvSpPr>
+        <p:spPr>
+          <a:xfrm>
+            <a:off x="4828579" y="3092329"/>
+            <a:ext cx="189257" cy="178683"/>
+          </a:xfrm>
+          <a:prstGeom prst="rect">
+            <a:avLst/>
+          </a:prstGeom>
+          <a:noFill/>
+        </p:spPr>
+        <p:txBody>
+          <a:bodyPr wrap="square" lIns="0" tIns="0" rIns="0" bIns="0" rtlCol="0">
+            <a:noAutofit/>
+          </a:bodyPr>
+          <a:lstStyle/>
+          <a:p>
+            <a:pPr algn="ctr"/>
+            <a:r>
+              <a:rPr lang="en-US" sz="1100" dirty="0">
+                <a:solidFill>
+                  <a:srgbClr val="7030A0"/>
+                </a:solidFill>
+              </a:rPr>
+              <a:t>1</a:t>
+            </a:r>
+            <a:endParaRPr lang="en-SG" sz="1100" dirty="0">
+              <a:solidFill>
+                <a:srgbClr val="7030A0"/>
+              </a:solidFill>
+            </a:endParaRPr>
+          </a:p>
+        </p:txBody>
+      </p:sp>
+      <p:sp>
+        <p:nvSpPr>
+          <p:cNvPr id="116" name="Rectangle 8">
+            <a:extLst>
+              <a:ext uri="{FF2B5EF4-FFF2-40B4-BE49-F238E27FC236}">
+                <a16:creationId xmlns:a16="http://schemas.microsoft.com/office/drawing/2014/main" id="{F8C389B8-40B0-4E54-A630-98B0ACEAF85C}"/>
+              </a:ext>
+            </a:extLst>
+          </p:cNvPr>
+          <p:cNvSpPr/>
+          <p:nvPr/>
+        </p:nvSpPr>
+        <p:spPr>
+          <a:xfrm>
+            <a:off x="8232145" y="2209800"/>
+            <a:ext cx="1284214" cy="271528"/>
+          </a:xfrm>
+          <a:prstGeom prst="rect">
+            <a:avLst/>
+          </a:prstGeom>
+          <a:ln w="19050">
+            <a:solidFill>
+              <a:srgbClr val="7030A0"/>
+            </a:solidFill>
+          </a:ln>
+          <a:effectLst/>
+        </p:spPr>
+        <p:style>
+          <a:lnRef idx="1">
+            <a:schemeClr val="accent4"/>
+          </a:lnRef>
+          <a:fillRef idx="2">
+            <a:schemeClr val="accent4"/>
+          </a:fillRef>
+          <a:effectRef idx="1">
+            <a:schemeClr val="accent4"/>
+          </a:effectRef>
+          <a:fontRef idx="minor">
+            <a:schemeClr val="dk1"/>
+          </a:fontRef>
+        </p:style>
+        <p:txBody>
+          <a:bodyPr rtlCol="0" anchor="ctr"/>
+          <a:lstStyle/>
+          <a:p>
+            <a:pPr algn="ctr"/>
+            <a:r>
+              <a:rPr lang="en-US" sz="1050" dirty="0">
+                <a:solidFill>
+                  <a:srgbClr val="7030A0"/>
+                </a:solidFill>
+              </a:rPr>
+              <a:t>Name</a:t>
+            </a:r>
+            <a:endParaRPr lang="en-SG" sz="1050" dirty="0">
+              <a:solidFill>
+                <a:srgbClr val="7030A0"/>
+              </a:solidFill>
+            </a:endParaRPr>
+          </a:p>
+        </p:txBody>
+      </p:sp>
+      <p:sp>
+        <p:nvSpPr>
+          <p:cNvPr id="117" name="Rectangle 8">
+            <a:extLst>
+              <a:ext uri="{FF2B5EF4-FFF2-40B4-BE49-F238E27FC236}">
+                <a16:creationId xmlns:a16="http://schemas.microsoft.com/office/drawing/2014/main" id="{0135D803-EA92-412A-A4F6-556A8001B76B}"/>
+              </a:ext>
+            </a:extLst>
+          </p:cNvPr>
+          <p:cNvSpPr/>
+          <p:nvPr/>
+        </p:nvSpPr>
+        <p:spPr>
+          <a:xfrm>
+            <a:off x="8232145" y="2547042"/>
+            <a:ext cx="1284214" cy="256656"/>
+          </a:xfrm>
+          <a:prstGeom prst="rect">
+            <a:avLst/>
+          </a:prstGeom>
+          <a:ln w="19050">
+            <a:solidFill>
+              <a:srgbClr val="7030A0"/>
+            </a:solidFill>
+          </a:ln>
+          <a:effectLst/>
+        </p:spPr>
+        <p:style>
+          <a:lnRef idx="1">
+            <a:schemeClr val="accent4"/>
+          </a:lnRef>
+          <a:fillRef idx="2">
+            <a:schemeClr val="accent4"/>
+          </a:fillRef>
+          <a:effectRef idx="1">
+            <a:schemeClr val="accent4"/>
+          </a:effectRef>
+          <a:fontRef idx="minor">
+            <a:schemeClr val="dk1"/>
+          </a:fontRef>
+        </p:style>
+        <p:txBody>
+          <a:bodyPr rtlCol="0" anchor="ctr"/>
+          <a:lstStyle/>
+          <a:p>
+            <a:pPr algn="ctr"/>
+            <a:r>
+              <a:rPr lang="en-US" sz="1050" dirty="0">
+                <a:solidFill>
+                  <a:srgbClr val="7030A0"/>
+                </a:solidFill>
+              </a:rPr>
+              <a:t>Price</a:t>
+            </a:r>
+            <a:endParaRPr lang="en-SG" sz="1050" dirty="0">
+              <a:solidFill>
+                <a:srgbClr val="7030A0"/>
+              </a:solidFill>
+            </a:endParaRPr>
+          </a:p>
+        </p:txBody>
+      </p:sp>
+      <p:sp>
+        <p:nvSpPr>
+          <p:cNvPr id="121" name="Rectangle 8">
+            <a:extLst>
+              <a:ext uri="{FF2B5EF4-FFF2-40B4-BE49-F238E27FC236}">
+                <a16:creationId xmlns:a16="http://schemas.microsoft.com/office/drawing/2014/main" id="{86234854-5D77-47F5-9CC6-3B8B82459830}"/>
+              </a:ext>
+            </a:extLst>
+          </p:cNvPr>
+          <p:cNvSpPr/>
+          <p:nvPr/>
+        </p:nvSpPr>
+        <p:spPr>
+          <a:xfrm>
+            <a:off x="8232145" y="2851991"/>
+            <a:ext cx="1284215" cy="319466"/>
+          </a:xfrm>
+          <a:prstGeom prst="rect">
+            <a:avLst/>
+          </a:prstGeom>
+          <a:ln w="19050">
+            <a:solidFill>
+              <a:srgbClr val="7030A0"/>
+            </a:solidFill>
+          </a:ln>
+          <a:effectLst/>
+        </p:spPr>
+        <p:style>
+          <a:lnRef idx="1">
+            <a:schemeClr val="accent4"/>
+          </a:lnRef>
+          <a:fillRef idx="2">
+            <a:schemeClr val="accent4"/>
+          </a:fillRef>
+          <a:effectRef idx="1">
+            <a:schemeClr val="accent4"/>
+          </a:effectRef>
+          <a:fontRef idx="minor">
+            <a:schemeClr val="dk1"/>
+          </a:fontRef>
+        </p:style>
+        <p:txBody>
+          <a:bodyPr rtlCol="0" anchor="ctr"/>
+          <a:lstStyle/>
+          <a:p>
+            <a:pPr algn="ctr"/>
+            <a:r>
+              <a:rPr lang="en-US" sz="1050" dirty="0">
+                <a:solidFill>
+                  <a:srgbClr val="7030A0"/>
+                </a:solidFill>
+              </a:rPr>
+              <a:t>Recipe</a:t>
+            </a:r>
+            <a:endParaRPr lang="en-SG" sz="1050" dirty="0">
+              <a:solidFill>
+                <a:srgbClr val="7030A0"/>
+              </a:solidFill>
+            </a:endParaRPr>
+          </a:p>
+        </p:txBody>
+      </p:sp>
+      <p:sp>
+        <p:nvSpPr>
+          <p:cNvPr id="123" name="Rectangle 8">
+            <a:extLst>
+              <a:ext uri="{FF2B5EF4-FFF2-40B4-BE49-F238E27FC236}">
+                <a16:creationId xmlns:a16="http://schemas.microsoft.com/office/drawing/2014/main" id="{284BBD6B-353F-45A4-8FCE-7F9E930EA835}"/>
+              </a:ext>
+            </a:extLst>
+          </p:cNvPr>
+          <p:cNvSpPr/>
+          <p:nvPr/>
+        </p:nvSpPr>
+        <p:spPr>
+          <a:xfrm>
+            <a:off x="8230819" y="3230012"/>
+            <a:ext cx="1294181" cy="345526"/>
+          </a:xfrm>
+          <a:prstGeom prst="rect">
+            <a:avLst/>
+          </a:prstGeom>
+          <a:ln w="19050">
+            <a:solidFill>
+              <a:srgbClr val="7030A0"/>
+            </a:solidFill>
+          </a:ln>
+          <a:effectLst/>
+        </p:spPr>
+        <p:style>
+          <a:lnRef idx="1">
+            <a:schemeClr val="accent4"/>
+          </a:lnRef>
+          <a:fillRef idx="2">
+            <a:schemeClr val="accent4"/>
+          </a:fillRef>
+          <a:effectRef idx="1">
+            <a:schemeClr val="accent4"/>
+          </a:effectRef>
+          <a:fontRef idx="minor">
+            <a:schemeClr val="dk1"/>
+          </a:fontRef>
+        </p:style>
+        <p:txBody>
+          <a:bodyPr rtlCol="0" anchor="ctr"/>
+          <a:lstStyle/>
+          <a:p>
+            <a:pPr algn="ctr"/>
+            <a:r>
+              <a:rPr lang="en-US" sz="1050" dirty="0" err="1">
+                <a:solidFill>
+                  <a:srgbClr val="7030A0"/>
+                </a:solidFill>
+              </a:rPr>
+              <a:t>RequiredIngredients</a:t>
+            </a:r>
+            <a:endParaRPr lang="en-SG" sz="1050" dirty="0">
+              <a:solidFill>
+                <a:srgbClr val="7030A0"/>
+              </a:solidFill>
+            </a:endParaRPr>
+          </a:p>
+        </p:txBody>
+      </p:sp>
+      <p:cxnSp>
+        <p:nvCxnSpPr>
+          <p:cNvPr id="125" name="Elbow Connector 106">
+            <a:extLst>
+              <a:ext uri="{FF2B5EF4-FFF2-40B4-BE49-F238E27FC236}">
+                <a16:creationId xmlns:a16="http://schemas.microsoft.com/office/drawing/2014/main" id="{C61670FA-4E22-473E-9D65-287FDD05FB55}"/>
+              </a:ext>
+            </a:extLst>
+          </p:cNvPr>
+          <p:cNvCxnSpPr>
+            <a:cxnSpLocks/>
+            <a:endCxn id="104" idx="2"/>
+          </p:cNvCxnSpPr>
+          <p:nvPr/>
+        </p:nvCxnSpPr>
+        <p:spPr>
+          <a:xfrm flipV="1">
+            <a:off x="2214717" y="3215360"/>
+            <a:ext cx="4777169" cy="599992"/>
+          </a:xfrm>
+          <a:prstGeom prst="bentConnector2">
+            <a:avLst/>
+          </a:prstGeom>
+          <a:ln w="19050">
+            <a:solidFill>
+              <a:srgbClr val="7030A0"/>
+            </a:solidFill>
+            <a:prstDash val="solid"/>
+            <a:headEnd type="none" w="med" len="med"/>
+            <a:tailEnd type="arrow" w="med" len="med"/>
+          </a:ln>
+          <a:effectLst/>
+        </p:spPr>
+        <p:style>
+          <a:lnRef idx="1">
+            <a:schemeClr val="accent2"/>
+          </a:lnRef>
+          <a:fillRef idx="2">
+            <a:schemeClr val="accent2"/>
+          </a:fillRef>
+          <a:effectRef idx="1">
+            <a:schemeClr val="accent2"/>
+          </a:effectRef>
+          <a:fontRef idx="minor">
+            <a:schemeClr val="dk1"/>
+          </a:fontRef>
+        </p:style>
+      </p:cxnSp>
+      <p:sp>
+        <p:nvSpPr>
+          <p:cNvPr id="126" name="TextBox 125">
+            <a:extLst>
+              <a:ext uri="{FF2B5EF4-FFF2-40B4-BE49-F238E27FC236}">
+                <a16:creationId xmlns:a16="http://schemas.microsoft.com/office/drawing/2014/main" id="{4A487BF1-44C6-4364-9022-3849233F8D67}"/>
+              </a:ext>
+            </a:extLst>
+          </p:cNvPr>
+          <p:cNvSpPr txBox="1"/>
+          <p:nvPr/>
+        </p:nvSpPr>
+        <p:spPr>
+          <a:xfrm rot="16200000">
+            <a:off x="6765110" y="3514346"/>
+            <a:ext cx="803467" cy="261610"/>
+          </a:xfrm>
+          <a:prstGeom prst="rect">
+            <a:avLst/>
+          </a:prstGeom>
+          <a:noFill/>
+        </p:spPr>
+        <p:txBody>
+          <a:bodyPr wrap="square" rtlCol="0">
+            <a:spAutoFit/>
+          </a:bodyPr>
+          <a:lstStyle/>
+          <a:p>
+            <a:pPr algn="r"/>
+            <a:r>
+              <a:rPr lang="en-US" sz="1100" dirty="0">
+                <a:solidFill>
+                  <a:srgbClr val="7030A0"/>
+                </a:solidFill>
+              </a:rPr>
+              <a:t>filtered list</a:t>
+            </a:r>
+            <a:endParaRPr lang="en-SG" sz="1100" dirty="0">
+              <a:solidFill>
+                <a:srgbClr val="7030A0"/>
+              </a:solidFill>
+            </a:endParaRPr>
+          </a:p>
+        </p:txBody>
+      </p:sp>
+      <p:sp>
+        <p:nvSpPr>
+          <p:cNvPr id="127" name="Rectangle 8">
+            <a:extLst>
+              <a:ext uri="{FF2B5EF4-FFF2-40B4-BE49-F238E27FC236}">
+                <a16:creationId xmlns:a16="http://schemas.microsoft.com/office/drawing/2014/main" id="{8E51FEC5-042A-453C-9802-A628A2B11AD4}"/>
+              </a:ext>
+            </a:extLst>
+          </p:cNvPr>
+          <p:cNvSpPr/>
+          <p:nvPr/>
+        </p:nvSpPr>
+        <p:spPr>
+          <a:xfrm>
+            <a:off x="5125058" y="5437118"/>
+            <a:ext cx="1410524" cy="346760"/>
+          </a:xfrm>
+          <a:prstGeom prst="rect">
+            <a:avLst/>
+          </a:prstGeom>
+          <a:ln w="19050">
+            <a:solidFill>
+              <a:srgbClr val="7030A0"/>
+            </a:solidFill>
+          </a:ln>
+          <a:effectLst/>
+        </p:spPr>
+        <p:style>
+          <a:lnRef idx="1">
+            <a:schemeClr val="accent4"/>
+          </a:lnRef>
+          <a:fillRef idx="2">
+            <a:schemeClr val="accent4"/>
+          </a:fillRef>
+          <a:effectRef idx="1">
+            <a:schemeClr val="accent4"/>
+          </a:effectRef>
+          <a:fontRef idx="minor">
+            <a:schemeClr val="dk1"/>
+          </a:fontRef>
+        </p:style>
+        <p:txBody>
+          <a:bodyPr rtlCol="0" anchor="ctr"/>
+          <a:lstStyle/>
+          <a:p>
+            <a:pPr algn="ctr"/>
+            <a:r>
+              <a:rPr lang="en-US" sz="1050" dirty="0" err="1">
+                <a:solidFill>
+                  <a:srgbClr val="7030A0"/>
+                </a:solidFill>
+              </a:rPr>
+              <a:t>UniqueReservationList</a:t>
+            </a:r>
+            <a:endParaRPr lang="en-SG" sz="1050" dirty="0">
+              <a:solidFill>
+                <a:srgbClr val="7030A0"/>
+              </a:solidFill>
+            </a:endParaRPr>
+          </a:p>
+        </p:txBody>
+      </p:sp>
+      <p:sp>
+        <p:nvSpPr>
+          <p:cNvPr id="128" name="Flowchart: Decision 96">
+            <a:extLst>
+              <a:ext uri="{FF2B5EF4-FFF2-40B4-BE49-F238E27FC236}">
+                <a16:creationId xmlns:a16="http://schemas.microsoft.com/office/drawing/2014/main" id="{3C16F000-DE6D-4432-BC70-EBA5B789F1CC}"/>
+              </a:ext>
+            </a:extLst>
+          </p:cNvPr>
+          <p:cNvSpPr/>
+          <p:nvPr/>
+        </p:nvSpPr>
+        <p:spPr>
+          <a:xfrm>
+            <a:off x="6532701" y="5507700"/>
+            <a:ext cx="236048" cy="173380"/>
+          </a:xfrm>
+          <a:prstGeom prst="flowChartDecision">
+            <a:avLst/>
+          </a:prstGeom>
+          <a:noFill/>
+          <a:ln w="19050">
+            <a:solidFill>
+              <a:srgbClr val="7030A0"/>
+            </a:solidFill>
+          </a:ln>
+          <a:effectLst/>
+        </p:spPr>
+        <p:style>
+          <a:lnRef idx="1">
+            <a:schemeClr val="accent6"/>
+          </a:lnRef>
+          <a:fillRef idx="2">
+            <a:schemeClr val="accent6"/>
+          </a:fillRef>
+          <a:effectRef idx="1">
+            <a:schemeClr val="accent6"/>
+          </a:effectRef>
+          <a:fontRef idx="minor">
+            <a:schemeClr val="dk1"/>
+          </a:fontRef>
+        </p:style>
+        <p:txBody>
+          <a:bodyPr rtlCol="0" anchor="ctr"/>
+          <a:lstStyle/>
+          <a:p>
+            <a:pPr algn="ctr"/>
+            <a:endParaRPr lang="en-US" sz="1050"/>
+          </a:p>
+        </p:txBody>
+      </p:sp>
+      <p:cxnSp>
+        <p:nvCxnSpPr>
+          <p:cNvPr id="129" name="Elbow Connector 63">
+            <a:extLst>
+              <a:ext uri="{FF2B5EF4-FFF2-40B4-BE49-F238E27FC236}">
+                <a16:creationId xmlns:a16="http://schemas.microsoft.com/office/drawing/2014/main" id="{0EF32D21-8553-4300-ABE6-37E789DC9EDF}"/>
+              </a:ext>
+            </a:extLst>
+          </p:cNvPr>
+          <p:cNvCxnSpPr>
+            <a:cxnSpLocks/>
+            <a:stCxn id="128" idx="3"/>
+            <a:endCxn id="133" idx="1"/>
+          </p:cNvCxnSpPr>
+          <p:nvPr/>
+        </p:nvCxnSpPr>
+        <p:spPr>
+          <a:xfrm flipV="1">
+            <a:off x="6768749" y="5583580"/>
+            <a:ext cx="321514" cy="10810"/>
+          </a:xfrm>
+          <a:prstGeom prst="bentConnector3">
+            <a:avLst>
+              <a:gd name="adj1" fmla="val -3131"/>
+            </a:avLst>
+          </a:prstGeom>
+          <a:ln w="19050">
+            <a:solidFill>
+              <a:srgbClr val="7030A0"/>
+            </a:solidFill>
+            <a:headEnd type="none" w="med" len="med"/>
+            <a:tailEnd type="arrow" w="med" len="med"/>
+          </a:ln>
+          <a:effectLst/>
+        </p:spPr>
+        <p:style>
+          <a:lnRef idx="1">
+            <a:schemeClr val="accent2"/>
+          </a:lnRef>
+          <a:fillRef idx="2">
+            <a:schemeClr val="accent2"/>
+          </a:fillRef>
+          <a:effectRef idx="1">
+            <a:schemeClr val="accent2"/>
+          </a:effectRef>
+          <a:fontRef idx="minor">
+            <a:schemeClr val="dk1"/>
+          </a:fontRef>
+        </p:style>
+      </p:cxnSp>
+      <p:sp>
+        <p:nvSpPr>
+          <p:cNvPr id="130" name="TextBox 129">
+            <a:extLst>
+              <a:ext uri="{FF2B5EF4-FFF2-40B4-BE49-F238E27FC236}">
+                <a16:creationId xmlns:a16="http://schemas.microsoft.com/office/drawing/2014/main" id="{CEA1942C-11D0-4965-A6C7-113E691CA934}"/>
+              </a:ext>
+            </a:extLst>
+          </p:cNvPr>
+          <p:cNvSpPr txBox="1"/>
+          <p:nvPr/>
+        </p:nvSpPr>
+        <p:spPr>
+          <a:xfrm>
+            <a:off x="6910168" y="5659562"/>
+            <a:ext cx="189257" cy="178683"/>
+          </a:xfrm>
+          <a:prstGeom prst="rect">
+            <a:avLst/>
+          </a:prstGeom>
+          <a:noFill/>
+        </p:spPr>
+        <p:txBody>
+          <a:bodyPr wrap="square" lIns="0" tIns="0" rIns="0" bIns="0" rtlCol="0">
+            <a:noAutofit/>
+          </a:bodyPr>
+          <a:lstStyle/>
+          <a:p>
+            <a:pPr algn="ctr"/>
+            <a:r>
+              <a:rPr lang="en-US" sz="1100" dirty="0">
+                <a:solidFill>
+                  <a:srgbClr val="7030A0"/>
+                </a:solidFill>
+              </a:rPr>
+              <a:t>*</a:t>
+            </a:r>
+            <a:endParaRPr lang="en-SG" sz="1100" dirty="0">
+              <a:solidFill>
+                <a:srgbClr val="7030A0"/>
+              </a:solidFill>
+            </a:endParaRPr>
+          </a:p>
+        </p:txBody>
+      </p:sp>
+      <p:cxnSp>
+        <p:nvCxnSpPr>
+          <p:cNvPr id="131" name="Elbow Connector 29">
+            <a:extLst>
+              <a:ext uri="{FF2B5EF4-FFF2-40B4-BE49-F238E27FC236}">
+                <a16:creationId xmlns:a16="http://schemas.microsoft.com/office/drawing/2014/main" id="{292AB436-FDAD-4D5C-B979-2A9345B64512}"/>
+              </a:ext>
+            </a:extLst>
+          </p:cNvPr>
+          <p:cNvCxnSpPr>
+            <a:cxnSpLocks/>
+            <a:stCxn id="51" idx="2"/>
+            <a:endCxn id="127" idx="1"/>
+          </p:cNvCxnSpPr>
+          <p:nvPr/>
+        </p:nvCxnSpPr>
+        <p:spPr>
+          <a:xfrm rot="16200000" flipH="1">
+            <a:off x="3680238" y="4165677"/>
+            <a:ext cx="2478733" cy="410908"/>
+          </a:xfrm>
+          <a:prstGeom prst="bentConnector2">
+            <a:avLst/>
+          </a:prstGeom>
+          <a:ln w="19050">
+            <a:solidFill>
+              <a:srgbClr val="7030A0"/>
+            </a:solidFill>
+            <a:headEnd type="none" w="med" len="med"/>
+            <a:tailEnd type="arrow" w="med" len="med"/>
+          </a:ln>
+          <a:effectLst/>
+        </p:spPr>
+        <p:style>
+          <a:lnRef idx="1">
+            <a:schemeClr val="accent2"/>
+          </a:lnRef>
+          <a:fillRef idx="2">
+            <a:schemeClr val="accent2"/>
+          </a:fillRef>
+          <a:effectRef idx="1">
+            <a:schemeClr val="accent2"/>
+          </a:effectRef>
+          <a:fontRef idx="minor">
+            <a:schemeClr val="dk1"/>
+          </a:fontRef>
+        </p:style>
+      </p:cxnSp>
+      <p:sp>
+        <p:nvSpPr>
+          <p:cNvPr id="132" name="TextBox 131">
+            <a:extLst>
+              <a:ext uri="{FF2B5EF4-FFF2-40B4-BE49-F238E27FC236}">
+                <a16:creationId xmlns:a16="http://schemas.microsoft.com/office/drawing/2014/main" id="{70E392C6-1A0A-481E-97BD-A6DE49904734}"/>
+              </a:ext>
+            </a:extLst>
+          </p:cNvPr>
+          <p:cNvSpPr txBox="1"/>
+          <p:nvPr/>
+        </p:nvSpPr>
+        <p:spPr>
+          <a:xfrm>
+            <a:off x="4855312" y="5400749"/>
+            <a:ext cx="189257" cy="178683"/>
+          </a:xfrm>
+          <a:prstGeom prst="rect">
+            <a:avLst/>
+          </a:prstGeom>
+          <a:noFill/>
+        </p:spPr>
+        <p:txBody>
+          <a:bodyPr wrap="square" lIns="0" tIns="0" rIns="0" bIns="0" rtlCol="0">
+            <a:noAutofit/>
+          </a:bodyPr>
+          <a:lstStyle/>
+          <a:p>
+            <a:pPr algn="ctr"/>
+            <a:r>
+              <a:rPr lang="en-US" sz="1100" dirty="0">
+                <a:solidFill>
+                  <a:srgbClr val="7030A0"/>
+                </a:solidFill>
+              </a:rPr>
+              <a:t>1</a:t>
+            </a:r>
+            <a:endParaRPr lang="en-SG" sz="1100" dirty="0">
+              <a:solidFill>
+                <a:srgbClr val="7030A0"/>
+              </a:solidFill>
+            </a:endParaRPr>
+          </a:p>
+        </p:txBody>
+      </p:sp>
+      <p:sp>
+        <p:nvSpPr>
+          <p:cNvPr id="133" name="Rectangle 8">
+            <a:extLst>
+              <a:ext uri="{FF2B5EF4-FFF2-40B4-BE49-F238E27FC236}">
+                <a16:creationId xmlns:a16="http://schemas.microsoft.com/office/drawing/2014/main" id="{5B9A0DCE-35FE-406B-8FFC-B7E509BDF8FB}"/>
+              </a:ext>
+            </a:extLst>
+          </p:cNvPr>
+          <p:cNvSpPr/>
+          <p:nvPr/>
+        </p:nvSpPr>
+        <p:spPr>
+          <a:xfrm>
+            <a:off x="7090263" y="5410200"/>
+            <a:ext cx="850913" cy="346760"/>
+          </a:xfrm>
+          <a:prstGeom prst="rect">
+            <a:avLst/>
+          </a:prstGeom>
+          <a:ln w="19050">
+            <a:solidFill>
+              <a:srgbClr val="7030A0"/>
+            </a:solidFill>
+          </a:ln>
+          <a:effectLst/>
+        </p:spPr>
+        <p:style>
+          <a:lnRef idx="1">
+            <a:schemeClr val="accent4"/>
+          </a:lnRef>
+          <a:fillRef idx="2">
+            <a:schemeClr val="accent4"/>
+          </a:fillRef>
+          <a:effectRef idx="1">
+            <a:schemeClr val="accent4"/>
+          </a:effectRef>
+          <a:fontRef idx="minor">
+            <a:schemeClr val="dk1"/>
+          </a:fontRef>
+        </p:style>
+        <p:txBody>
+          <a:bodyPr rtlCol="0" anchor="ctr"/>
+          <a:lstStyle/>
+          <a:p>
+            <a:pPr algn="ctr"/>
+            <a:r>
+              <a:rPr lang="en-US" sz="1050" dirty="0">
+                <a:solidFill>
+                  <a:srgbClr val="7030A0"/>
+                </a:solidFill>
+              </a:rPr>
+              <a:t>Reservation</a:t>
+            </a:r>
+            <a:endParaRPr lang="en-SG" sz="1050" dirty="0">
+              <a:solidFill>
+                <a:srgbClr val="7030A0"/>
+              </a:solidFill>
+            </a:endParaRPr>
+          </a:p>
+        </p:txBody>
+      </p:sp>
+      <p:sp>
+        <p:nvSpPr>
+          <p:cNvPr id="134" name="Rectangle 8">
+            <a:extLst>
+              <a:ext uri="{FF2B5EF4-FFF2-40B4-BE49-F238E27FC236}">
+                <a16:creationId xmlns:a16="http://schemas.microsoft.com/office/drawing/2014/main" id="{08D124F1-534E-430A-818E-D30ABA5365D5}"/>
+              </a:ext>
+            </a:extLst>
+          </p:cNvPr>
+          <p:cNvSpPr/>
+          <p:nvPr/>
+        </p:nvSpPr>
+        <p:spPr>
+          <a:xfrm>
+            <a:off x="8723322" y="5105400"/>
+            <a:ext cx="1030278" cy="285783"/>
+          </a:xfrm>
+          <a:prstGeom prst="rect">
+            <a:avLst/>
+          </a:prstGeom>
+          <a:ln w="19050">
+            <a:solidFill>
+              <a:srgbClr val="7030A0"/>
+            </a:solidFill>
+          </a:ln>
+          <a:effectLst/>
+        </p:spPr>
+        <p:style>
+          <a:lnRef idx="1">
+            <a:schemeClr val="accent4"/>
+          </a:lnRef>
+          <a:fillRef idx="2">
+            <a:schemeClr val="accent4"/>
+          </a:fillRef>
+          <a:effectRef idx="1">
+            <a:schemeClr val="accent4"/>
+          </a:effectRef>
+          <a:fontRef idx="minor">
+            <a:schemeClr val="dk1"/>
+          </a:fontRef>
+        </p:style>
+        <p:txBody>
+          <a:bodyPr rtlCol="0" anchor="ctr"/>
+          <a:lstStyle/>
+          <a:p>
+            <a:pPr algn="ctr"/>
+            <a:r>
+              <a:rPr lang="en-SG" sz="1050" dirty="0">
+                <a:solidFill>
+                  <a:srgbClr val="7030A0"/>
+                </a:solidFill>
+              </a:rPr>
+              <a:t>Name</a:t>
+            </a:r>
+          </a:p>
+        </p:txBody>
+      </p:sp>
+      <p:sp>
+        <p:nvSpPr>
+          <p:cNvPr id="135" name="Flowchart: Decision 96">
+            <a:extLst>
+              <a:ext uri="{FF2B5EF4-FFF2-40B4-BE49-F238E27FC236}">
+                <a16:creationId xmlns:a16="http://schemas.microsoft.com/office/drawing/2014/main" id="{4F2A25B6-438D-4FD4-B140-758217461C5D}"/>
+              </a:ext>
+            </a:extLst>
+          </p:cNvPr>
+          <p:cNvSpPr/>
+          <p:nvPr/>
+        </p:nvSpPr>
+        <p:spPr>
+          <a:xfrm>
+            <a:off x="7949853" y="5485056"/>
+            <a:ext cx="236048" cy="173380"/>
+          </a:xfrm>
+          <a:prstGeom prst="flowChartDecision">
+            <a:avLst/>
+          </a:prstGeom>
+          <a:solidFill>
+            <a:srgbClr val="7030A0"/>
+          </a:solidFill>
+          <a:ln w="19050">
+            <a:solidFill>
+              <a:srgbClr val="7030A0"/>
+            </a:solidFill>
+          </a:ln>
+          <a:effectLst/>
+        </p:spPr>
+        <p:style>
+          <a:lnRef idx="1">
+            <a:schemeClr val="accent6"/>
+          </a:lnRef>
+          <a:fillRef idx="2">
+            <a:schemeClr val="accent6"/>
+          </a:fillRef>
+          <a:effectRef idx="1">
+            <a:schemeClr val="accent6"/>
+          </a:effectRef>
+          <a:fontRef idx="minor">
+            <a:schemeClr val="dk1"/>
+          </a:fontRef>
+        </p:style>
+        <p:txBody>
+          <a:bodyPr rtlCol="0" anchor="ctr"/>
+          <a:lstStyle/>
+          <a:p>
+            <a:pPr algn="ctr"/>
+            <a:endParaRPr lang="en-US" sz="1050"/>
+          </a:p>
+        </p:txBody>
+      </p:sp>
+      <p:cxnSp>
+        <p:nvCxnSpPr>
+          <p:cNvPr id="136" name="Elbow Connector 78">
+            <a:extLst>
+              <a:ext uri="{FF2B5EF4-FFF2-40B4-BE49-F238E27FC236}">
+                <a16:creationId xmlns:a16="http://schemas.microsoft.com/office/drawing/2014/main" id="{EE8279D2-EC3E-4AFC-AA24-B356F0094D1D}"/>
+              </a:ext>
+            </a:extLst>
+          </p:cNvPr>
+          <p:cNvCxnSpPr>
+            <a:cxnSpLocks/>
+            <a:stCxn id="135" idx="3"/>
+            <a:endCxn id="134" idx="1"/>
+          </p:cNvCxnSpPr>
+          <p:nvPr/>
+        </p:nvCxnSpPr>
+        <p:spPr>
+          <a:xfrm flipV="1">
+            <a:off x="8185901" y="5248292"/>
+            <a:ext cx="537421" cy="323454"/>
+          </a:xfrm>
+          <a:prstGeom prst="bentConnector3">
+            <a:avLst>
+              <a:gd name="adj1" fmla="val 50000"/>
+            </a:avLst>
+          </a:prstGeom>
+          <a:ln w="19050">
+            <a:solidFill>
+              <a:srgbClr val="7030A0"/>
+            </a:solidFill>
+            <a:headEnd type="none" w="med" len="med"/>
+            <a:tailEnd type="arrow" w="med" len="med"/>
+          </a:ln>
+          <a:effectLst/>
+        </p:spPr>
+        <p:style>
+          <a:lnRef idx="1">
+            <a:schemeClr val="accent2"/>
+          </a:lnRef>
+          <a:fillRef idx="2">
+            <a:schemeClr val="accent2"/>
+          </a:fillRef>
+          <a:effectRef idx="1">
+            <a:schemeClr val="accent2"/>
+          </a:effectRef>
+          <a:fontRef idx="minor">
+            <a:schemeClr val="dk1"/>
+          </a:fontRef>
+        </p:style>
+      </p:cxnSp>
+      <p:sp>
+        <p:nvSpPr>
+          <p:cNvPr id="137" name="Rectangle 8">
+            <a:extLst>
+              <a:ext uri="{FF2B5EF4-FFF2-40B4-BE49-F238E27FC236}">
+                <a16:creationId xmlns:a16="http://schemas.microsoft.com/office/drawing/2014/main" id="{F8ACBBBA-03AF-4B5A-A027-B19FA5F6DDA0}"/>
+              </a:ext>
+            </a:extLst>
+          </p:cNvPr>
+          <p:cNvSpPr/>
+          <p:nvPr/>
+        </p:nvSpPr>
+        <p:spPr>
+          <a:xfrm>
+            <a:off x="8726497" y="5450469"/>
+            <a:ext cx="1027103" cy="285783"/>
+          </a:xfrm>
+          <a:prstGeom prst="rect">
+            <a:avLst/>
+          </a:prstGeom>
+          <a:ln w="19050">
+            <a:solidFill>
+              <a:srgbClr val="7030A0"/>
+            </a:solidFill>
+          </a:ln>
+          <a:effectLst/>
+        </p:spPr>
+        <p:style>
+          <a:lnRef idx="1">
+            <a:schemeClr val="accent4"/>
+          </a:lnRef>
+          <a:fillRef idx="2">
+            <a:schemeClr val="accent4"/>
+          </a:fillRef>
+          <a:effectRef idx="1">
+            <a:schemeClr val="accent4"/>
+          </a:effectRef>
+          <a:fontRef idx="minor">
+            <a:schemeClr val="dk1"/>
+          </a:fontRef>
+        </p:style>
+        <p:txBody>
+          <a:bodyPr rtlCol="0" anchor="ctr"/>
+          <a:lstStyle/>
+          <a:p>
+            <a:pPr algn="ctr"/>
+            <a:r>
+              <a:rPr lang="en-US" sz="1050" dirty="0">
+                <a:solidFill>
+                  <a:srgbClr val="7030A0"/>
+                </a:solidFill>
+              </a:rPr>
+              <a:t>Pax</a:t>
+            </a:r>
+            <a:endParaRPr lang="en-SG" sz="1050" dirty="0">
+              <a:solidFill>
+                <a:srgbClr val="7030A0"/>
+              </a:solidFill>
+            </a:endParaRPr>
+          </a:p>
+        </p:txBody>
+      </p:sp>
+      <p:cxnSp>
+        <p:nvCxnSpPr>
+          <p:cNvPr id="138" name="Elbow Connector 80">
+            <a:extLst>
+              <a:ext uri="{FF2B5EF4-FFF2-40B4-BE49-F238E27FC236}">
+                <a16:creationId xmlns:a16="http://schemas.microsoft.com/office/drawing/2014/main" id="{DE654905-3321-4A33-AF5D-45C408522507}"/>
+              </a:ext>
+            </a:extLst>
+          </p:cNvPr>
+          <p:cNvCxnSpPr>
+            <a:cxnSpLocks/>
+            <a:stCxn id="135" idx="3"/>
+            <a:endCxn id="137" idx="1"/>
+          </p:cNvCxnSpPr>
+          <p:nvPr/>
+        </p:nvCxnSpPr>
+        <p:spPr>
+          <a:xfrm>
+            <a:off x="8185901" y="5571746"/>
+            <a:ext cx="540596" cy="21615"/>
+          </a:xfrm>
+          <a:prstGeom prst="bentConnector3">
+            <a:avLst>
+              <a:gd name="adj1" fmla="val 50000"/>
+            </a:avLst>
+          </a:prstGeom>
+          <a:ln w="19050">
+            <a:solidFill>
+              <a:srgbClr val="7030A0"/>
+            </a:solidFill>
+            <a:headEnd type="none" w="med" len="med"/>
+            <a:tailEnd type="arrow" w="med" len="med"/>
+          </a:ln>
+          <a:effectLst/>
+        </p:spPr>
+        <p:style>
+          <a:lnRef idx="1">
+            <a:schemeClr val="accent2"/>
+          </a:lnRef>
+          <a:fillRef idx="2">
+            <a:schemeClr val="accent2"/>
+          </a:fillRef>
+          <a:effectRef idx="1">
+            <a:schemeClr val="accent2"/>
+          </a:effectRef>
+          <a:fontRef idx="minor">
+            <a:schemeClr val="dk1"/>
+          </a:fontRef>
+        </p:style>
+      </p:cxnSp>
+      <p:sp>
+        <p:nvSpPr>
+          <p:cNvPr id="139" name="Rectangle 8">
+            <a:extLst>
+              <a:ext uri="{FF2B5EF4-FFF2-40B4-BE49-F238E27FC236}">
+                <a16:creationId xmlns:a16="http://schemas.microsoft.com/office/drawing/2014/main" id="{6C27C669-1337-4CFB-AA11-625ED7C10A72}"/>
+              </a:ext>
+            </a:extLst>
+          </p:cNvPr>
+          <p:cNvSpPr/>
+          <p:nvPr/>
+        </p:nvSpPr>
+        <p:spPr>
+          <a:xfrm>
+            <a:off x="8726497" y="5795538"/>
+            <a:ext cx="1027103" cy="285783"/>
+          </a:xfrm>
+          <a:prstGeom prst="rect">
+            <a:avLst/>
+          </a:prstGeom>
+          <a:ln w="19050">
+            <a:solidFill>
+              <a:srgbClr val="7030A0"/>
+            </a:solidFill>
+          </a:ln>
+          <a:effectLst/>
+        </p:spPr>
+        <p:style>
+          <a:lnRef idx="1">
+            <a:schemeClr val="accent4"/>
+          </a:lnRef>
+          <a:fillRef idx="2">
+            <a:schemeClr val="accent4"/>
+          </a:fillRef>
+          <a:effectRef idx="1">
+            <a:schemeClr val="accent4"/>
+          </a:effectRef>
+          <a:fontRef idx="minor">
+            <a:schemeClr val="dk1"/>
+          </a:fontRef>
+        </p:style>
+        <p:txBody>
+          <a:bodyPr rtlCol="0" anchor="ctr"/>
+          <a:lstStyle/>
+          <a:p>
+            <a:pPr algn="ctr"/>
+            <a:r>
+              <a:rPr lang="en-US" sz="1050" dirty="0" err="1">
+                <a:solidFill>
+                  <a:srgbClr val="7030A0"/>
+                </a:solidFill>
+              </a:rPr>
+              <a:t>LocalDateTime</a:t>
+            </a:r>
+            <a:endParaRPr lang="en-SG" sz="1050" dirty="0">
+              <a:solidFill>
+                <a:srgbClr val="7030A0"/>
+              </a:solidFill>
+            </a:endParaRPr>
+          </a:p>
+        </p:txBody>
+      </p:sp>
+      <p:cxnSp>
+        <p:nvCxnSpPr>
+          <p:cNvPr id="140" name="Elbow Connector 78">
+            <a:extLst>
+              <a:ext uri="{FF2B5EF4-FFF2-40B4-BE49-F238E27FC236}">
+                <a16:creationId xmlns:a16="http://schemas.microsoft.com/office/drawing/2014/main" id="{88BC6651-B444-46C7-A165-C873A944C506}"/>
+              </a:ext>
+            </a:extLst>
+          </p:cNvPr>
+          <p:cNvCxnSpPr>
+            <a:cxnSpLocks/>
+            <a:stCxn id="135" idx="3"/>
+            <a:endCxn id="139" idx="1"/>
+          </p:cNvCxnSpPr>
+          <p:nvPr/>
+        </p:nvCxnSpPr>
+        <p:spPr>
+          <a:xfrm>
+            <a:off x="8185901" y="5571746"/>
+            <a:ext cx="540596" cy="366684"/>
+          </a:xfrm>
+          <a:prstGeom prst="bentConnector3">
+            <a:avLst>
+              <a:gd name="adj1" fmla="val 50000"/>
+            </a:avLst>
+          </a:prstGeom>
+          <a:ln w="19050">
+            <a:solidFill>
+              <a:srgbClr val="7030A0"/>
+            </a:solidFill>
+            <a:headEnd type="none" w="med" len="med"/>
+            <a:tailEnd type="arrow" w="med" len="med"/>
+          </a:ln>
+          <a:effectLst/>
+        </p:spPr>
+        <p:style>
+          <a:lnRef idx="1">
+            <a:schemeClr val="accent2"/>
+          </a:lnRef>
+          <a:fillRef idx="2">
+            <a:schemeClr val="accent2"/>
+          </a:fillRef>
+          <a:effectRef idx="1">
+            <a:schemeClr val="accent2"/>
+          </a:effectRef>
+          <a:fontRef idx="minor">
+            <a:schemeClr val="dk1"/>
+          </a:fontRef>
+        </p:style>
+      </p:cxnSp>
+      <p:cxnSp>
+        <p:nvCxnSpPr>
+          <p:cNvPr id="160" name="Elbow Connector 106">
+            <a:extLst>
+              <a:ext uri="{FF2B5EF4-FFF2-40B4-BE49-F238E27FC236}">
+                <a16:creationId xmlns:a16="http://schemas.microsoft.com/office/drawing/2014/main" id="{EE2007F0-323E-4FDE-9BD2-6BFCBDC08FE7}"/>
+              </a:ext>
+            </a:extLst>
+          </p:cNvPr>
+          <p:cNvCxnSpPr>
+            <a:cxnSpLocks/>
+            <a:stCxn id="9" idx="1"/>
+            <a:endCxn id="133" idx="2"/>
+          </p:cNvCxnSpPr>
+          <p:nvPr/>
+        </p:nvCxnSpPr>
+        <p:spPr>
+          <a:xfrm rot="16200000" flipH="1">
+            <a:off x="3892537" y="2133777"/>
+            <a:ext cx="1939012" cy="5307354"/>
+          </a:xfrm>
+          <a:prstGeom prst="bentConnector3">
+            <a:avLst>
+              <a:gd name="adj1" fmla="val 137183"/>
+            </a:avLst>
+          </a:prstGeom>
+          <a:ln w="19050">
+            <a:solidFill>
+              <a:srgbClr val="7030A0"/>
+            </a:solidFill>
+            <a:prstDash val="solid"/>
+            <a:headEnd type="none" w="med" len="med"/>
+            <a:tailEnd type="arrow" w="med" len="med"/>
+          </a:ln>
+          <a:effectLst/>
+        </p:spPr>
+        <p:style>
+          <a:lnRef idx="1">
+            <a:schemeClr val="accent2"/>
+          </a:lnRef>
+          <a:fillRef idx="2">
+            <a:schemeClr val="accent2"/>
+          </a:fillRef>
+          <a:effectRef idx="1">
+            <a:schemeClr val="accent2"/>
+          </a:effectRef>
+          <a:fontRef idx="minor">
+            <a:schemeClr val="dk1"/>
+          </a:fontRef>
+        </p:style>
+      </p:cxnSp>
+      <p:sp>
+        <p:nvSpPr>
+          <p:cNvPr id="163" name="TextBox 162">
+            <a:extLst>
+              <a:ext uri="{FF2B5EF4-FFF2-40B4-BE49-F238E27FC236}">
+                <a16:creationId xmlns:a16="http://schemas.microsoft.com/office/drawing/2014/main" id="{51FDC757-E2E0-4ECC-88EE-933888B2BACA}"/>
+              </a:ext>
+            </a:extLst>
+          </p:cNvPr>
+          <p:cNvSpPr txBox="1"/>
+          <p:nvPr/>
+        </p:nvSpPr>
+        <p:spPr>
+          <a:xfrm rot="16200000">
+            <a:off x="7245028" y="6076101"/>
+            <a:ext cx="881018" cy="261610"/>
+          </a:xfrm>
+          <a:prstGeom prst="rect">
+            <a:avLst/>
+          </a:prstGeom>
+          <a:noFill/>
+        </p:spPr>
+        <p:txBody>
+          <a:bodyPr wrap="square" rtlCol="0">
+            <a:spAutoFit/>
+          </a:bodyPr>
+          <a:lstStyle/>
+          <a:p>
+            <a:pPr algn="r"/>
+            <a:r>
+              <a:rPr lang="en-US" sz="1100" dirty="0">
+                <a:solidFill>
+                  <a:srgbClr val="7030A0"/>
+                </a:solidFill>
+              </a:rPr>
+              <a:t>filtered list</a:t>
+            </a:r>
+            <a:endParaRPr lang="en-SG" sz="1100" dirty="0">
+              <a:solidFill>
+                <a:srgbClr val="7030A0"/>
+              </a:solidFill>
+            </a:endParaRPr>
+          </a:p>
+        </p:txBody>
+      </p:sp>
     </p:spTree>
     <p:extLst>
       <p:ext uri="{BB962C8B-B14F-4D97-AF65-F5344CB8AC3E}">

</xml_diff>

<commit_message>
Update Model OOP diagram with SalesRecord
</commit_message>
<xml_diff>
--- a/docs/diagrams/ModelComponentClassBetterOopDiagram.pptx
+++ b/docs/diagrams/ModelComponentClassBetterOopDiagram.pptx
@@ -208,7 +208,7 @@
           <a:p>
             <a:fld id="{F5CC4B3F-88C1-4FFA-B1B6-F41C21DC6924}" type="datetimeFigureOut">
               <a:rPr lang="en-US" smtClean="0"/>
-              <a:t>10/29/2018</a:t>
+              <a:t>10/30/2018</a:t>
             </a:fld>
             <a:endParaRPr lang="en-US"/>
           </a:p>
@@ -654,7 +654,7 @@
           <a:p>
             <a:fld id="{78C97017-6FC3-485B-9764-EAC9E56C1D49}" type="datetimeFigureOut">
               <a:rPr lang="en-US" smtClean="0"/>
-              <a:t>10/29/2018</a:t>
+              <a:t>10/30/2018</a:t>
             </a:fld>
             <a:endParaRPr lang="en-US"/>
           </a:p>
@@ -822,7 +822,7 @@
           <a:p>
             <a:fld id="{78C97017-6FC3-485B-9764-EAC9E56C1D49}" type="datetimeFigureOut">
               <a:rPr lang="en-US" smtClean="0"/>
-              <a:t>10/29/2018</a:t>
+              <a:t>10/30/2018</a:t>
             </a:fld>
             <a:endParaRPr lang="en-US"/>
           </a:p>
@@ -1000,7 +1000,7 @@
           <a:p>
             <a:fld id="{78C97017-6FC3-485B-9764-EAC9E56C1D49}" type="datetimeFigureOut">
               <a:rPr lang="en-US" smtClean="0"/>
-              <a:t>10/29/2018</a:t>
+              <a:t>10/30/2018</a:t>
             </a:fld>
             <a:endParaRPr lang="en-US"/>
           </a:p>
@@ -1168,7 +1168,7 @@
           <a:p>
             <a:fld id="{78C97017-6FC3-485B-9764-EAC9E56C1D49}" type="datetimeFigureOut">
               <a:rPr lang="en-US" smtClean="0"/>
-              <a:t>10/29/2018</a:t>
+              <a:t>10/30/2018</a:t>
             </a:fld>
             <a:endParaRPr lang="en-US"/>
           </a:p>
@@ -1413,7 +1413,7 @@
           <a:p>
             <a:fld id="{78C97017-6FC3-485B-9764-EAC9E56C1D49}" type="datetimeFigureOut">
               <a:rPr lang="en-US" smtClean="0"/>
-              <a:t>10/29/2018</a:t>
+              <a:t>10/30/2018</a:t>
             </a:fld>
             <a:endParaRPr lang="en-US"/>
           </a:p>
@@ -1698,7 +1698,7 @@
           <a:p>
             <a:fld id="{78C97017-6FC3-485B-9764-EAC9E56C1D49}" type="datetimeFigureOut">
               <a:rPr lang="en-US" smtClean="0"/>
-              <a:t>10/29/2018</a:t>
+              <a:t>10/30/2018</a:t>
             </a:fld>
             <a:endParaRPr lang="en-US"/>
           </a:p>
@@ -2117,7 +2117,7 @@
           <a:p>
             <a:fld id="{78C97017-6FC3-485B-9764-EAC9E56C1D49}" type="datetimeFigureOut">
               <a:rPr lang="en-US" smtClean="0"/>
-              <a:t>10/29/2018</a:t>
+              <a:t>10/30/2018</a:t>
             </a:fld>
             <a:endParaRPr lang="en-US"/>
           </a:p>
@@ -2234,7 +2234,7 @@
           <a:p>
             <a:fld id="{78C97017-6FC3-485B-9764-EAC9E56C1D49}" type="datetimeFigureOut">
               <a:rPr lang="en-US" smtClean="0"/>
-              <a:t>10/29/2018</a:t>
+              <a:t>10/30/2018</a:t>
             </a:fld>
             <a:endParaRPr lang="en-US"/>
           </a:p>
@@ -2329,7 +2329,7 @@
           <a:p>
             <a:fld id="{78C97017-6FC3-485B-9764-EAC9E56C1D49}" type="datetimeFigureOut">
               <a:rPr lang="en-US" smtClean="0"/>
-              <a:t>10/29/2018</a:t>
+              <a:t>10/30/2018</a:t>
             </a:fld>
             <a:endParaRPr lang="en-US"/>
           </a:p>
@@ -2604,7 +2604,7 @@
           <a:p>
             <a:fld id="{78C97017-6FC3-485B-9764-EAC9E56C1D49}" type="datetimeFigureOut">
               <a:rPr lang="en-US" smtClean="0"/>
-              <a:t>10/29/2018</a:t>
+              <a:t>10/30/2018</a:t>
             </a:fld>
             <a:endParaRPr lang="en-US"/>
           </a:p>
@@ -2856,7 +2856,7 @@
           <a:p>
             <a:fld id="{78C97017-6FC3-485B-9764-EAC9E56C1D49}" type="datetimeFigureOut">
               <a:rPr lang="en-US" smtClean="0"/>
-              <a:t>10/29/2018</a:t>
+              <a:t>10/30/2018</a:t>
             </a:fld>
             <a:endParaRPr lang="en-US"/>
           </a:p>
@@ -3067,7 +3067,7 @@
           <a:p>
             <a:fld id="{78C97017-6FC3-485B-9764-EAC9E56C1D49}" type="datetimeFigureOut">
               <a:rPr lang="en-US" smtClean="0"/>
-              <a:t>10/29/2018</a:t>
+              <a:t>10/30/2018</a:t>
             </a:fld>
             <a:endParaRPr lang="en-US"/>
           </a:p>
@@ -3450,8 +3450,8 @@
         </p:nvSpPr>
         <p:spPr>
           <a:xfrm>
-            <a:off x="773902" y="-1502326"/>
-            <a:ext cx="8305799" cy="3059747"/>
+            <a:off x="675679" y="1472202"/>
+            <a:ext cx="9611321" cy="6604998"/>
           </a:xfrm>
           <a:prstGeom prst="roundRect">
             <a:avLst>
@@ -3827,7 +3827,9 @@
       <p:cxnSp>
         <p:nvCxnSpPr>
           <p:cNvPr id="75" name="Elbow Connector 122"/>
-          <p:cNvCxnSpPr/>
+          <p:cNvCxnSpPr>
+            <a:cxnSpLocks/>
+          </p:cNvCxnSpPr>
           <p:nvPr/>
         </p:nvCxnSpPr>
         <p:spPr>
@@ -4393,7 +4395,7 @@
         <p:spPr>
           <a:xfrm>
             <a:off x="8232145" y="3733800"/>
-            <a:ext cx="1284214" cy="285783"/>
+            <a:ext cx="911855" cy="285783"/>
           </a:xfrm>
           <a:prstGeom prst="rect">
             <a:avLst/>
@@ -4538,7 +4540,7 @@
         <p:spPr>
           <a:xfrm>
             <a:off x="8232145" y="4078364"/>
-            <a:ext cx="1284214" cy="285783"/>
+            <a:ext cx="911855" cy="285783"/>
           </a:xfrm>
           <a:prstGeom prst="rect">
             <a:avLst/>
@@ -5674,7 +5676,7 @@
         <p:spPr>
           <a:xfrm>
             <a:off x="4805374" y="3044718"/>
-            <a:ext cx="289135" cy="3010"/>
+            <a:ext cx="340264" cy="3010"/>
           </a:xfrm>
           <a:prstGeom prst="bentConnector3">
             <a:avLst/>
@@ -5717,8 +5719,8 @@
         </p:nvSpPr>
         <p:spPr>
           <a:xfrm>
-            <a:off x="5094509" y="2874348"/>
-            <a:ext cx="1156969" cy="346760"/>
+            <a:off x="5145638" y="2874348"/>
+            <a:ext cx="1105840" cy="346760"/>
           </a:xfrm>
           <a:prstGeom prst="rect">
             <a:avLst/>
@@ -6186,8 +6188,8 @@
         </p:nvCxnSpPr>
         <p:spPr>
           <a:xfrm flipV="1">
-            <a:off x="7587624" y="2345564"/>
-            <a:ext cx="644521" cy="716790"/>
+            <a:off x="7587624" y="2353233"/>
+            <a:ext cx="644521" cy="709121"/>
           </a:xfrm>
           <a:prstGeom prst="bentConnector3">
             <a:avLst>
@@ -6423,7 +6425,7 @@
         </p:nvSpPr>
         <p:spPr>
           <a:xfrm>
-            <a:off x="8232145" y="2209800"/>
+            <a:off x="8232145" y="2217469"/>
             <a:ext cx="1284214" cy="271528"/>
           </a:xfrm>
           <a:prstGeom prst="rect">
@@ -6668,17 +6670,20 @@
           </p:cNvPr>
           <p:cNvCxnSpPr>
             <a:cxnSpLocks/>
+            <a:stCxn id="9" idx="1"/>
             <a:endCxn id="104" idx="2"/>
           </p:cNvCxnSpPr>
           <p:nvPr/>
         </p:nvCxnSpPr>
         <p:spPr>
-          <a:xfrm flipV="1">
-            <a:off x="2214717" y="3215360"/>
-            <a:ext cx="4777169" cy="599992"/>
-          </a:xfrm>
-          <a:prstGeom prst="bentConnector2">
-            <a:avLst/>
+          <a:xfrm rot="5400000" flipH="1" flipV="1">
+            <a:off x="4298832" y="1124894"/>
+            <a:ext cx="602588" cy="4783520"/>
+          </a:xfrm>
+          <a:prstGeom prst="bentConnector3">
+            <a:avLst>
+              <a:gd name="adj1" fmla="val -19320"/>
+            </a:avLst>
           </a:prstGeom>
           <a:ln w="19050">
             <a:solidFill>
@@ -6765,7 +6770,7 @@
         <p:spPr>
           <a:xfrm>
             <a:off x="5125058" y="5437118"/>
-            <a:ext cx="1410524" cy="346760"/>
+            <a:ext cx="1404468" cy="346760"/>
           </a:xfrm>
           <a:prstGeom prst="rect">
             <a:avLst/>
@@ -6881,12 +6886,12 @@
         </p:nvCxnSpPr>
         <p:spPr>
           <a:xfrm flipV="1">
-            <a:off x="6768749" y="5583580"/>
-            <a:ext cx="321514" cy="10810"/>
+            <a:off x="6768749" y="5593016"/>
+            <a:ext cx="236048" cy="1374"/>
           </a:xfrm>
           <a:prstGeom prst="bentConnector3">
             <a:avLst>
-              <a:gd name="adj1" fmla="val -3131"/>
+              <a:gd name="adj1" fmla="val 50000"/>
             </a:avLst>
           </a:prstGeom>
           <a:ln w="19050">
@@ -6927,7 +6932,7 @@
         </p:nvSpPr>
         <p:spPr>
           <a:xfrm>
-            <a:off x="6910168" y="5659562"/>
+            <a:off x="6833968" y="5659562"/>
             <a:ext cx="189257" cy="178683"/>
           </a:xfrm>
           <a:prstGeom prst="rect">
@@ -7065,7 +7070,7 @@
         </p:nvSpPr>
         <p:spPr>
           <a:xfrm>
-            <a:off x="7090263" y="5410200"/>
+            <a:off x="7004797" y="5419636"/>
             <a:ext cx="850913" cy="346760"/>
           </a:xfrm>
           <a:prstGeom prst="rect">
@@ -7127,8 +7132,8 @@
         </p:nvSpPr>
         <p:spPr>
           <a:xfrm>
-            <a:off x="8723322" y="5105400"/>
-            <a:ext cx="1030278" cy="285783"/>
+            <a:off x="8622069" y="5097280"/>
+            <a:ext cx="1030278" cy="259803"/>
           </a:xfrm>
           <a:prstGeom prst="rect">
             <a:avLst/>
@@ -7184,7 +7189,7 @@
         </p:nvSpPr>
         <p:spPr>
           <a:xfrm>
-            <a:off x="7949853" y="5485056"/>
+            <a:off x="7865364" y="5483260"/>
             <a:ext cx="236048" cy="173380"/>
           </a:xfrm>
           <a:prstGeom prst="flowChartDecision">
@@ -7241,8 +7246,8 @@
         </p:nvCxnSpPr>
         <p:spPr>
           <a:xfrm flipV="1">
-            <a:off x="8185901" y="5248292"/>
-            <a:ext cx="537421" cy="323454"/>
+            <a:off x="8101412" y="5227182"/>
+            <a:ext cx="520657" cy="342768"/>
           </a:xfrm>
           <a:prstGeom prst="bentConnector3">
             <a:avLst>
@@ -7287,8 +7292,8 @@
         </p:nvSpPr>
         <p:spPr>
           <a:xfrm>
-            <a:off x="8726497" y="5450469"/>
-            <a:ext cx="1027103" cy="285783"/>
+            <a:off x="8622069" y="5441844"/>
+            <a:ext cx="1027103" cy="259803"/>
           </a:xfrm>
           <a:prstGeom prst="rect">
             <a:avLst/>
@@ -7353,8 +7358,8 @@
         </p:nvCxnSpPr>
         <p:spPr>
           <a:xfrm>
-            <a:off x="8185901" y="5571746"/>
-            <a:ext cx="540596" cy="21615"/>
+            <a:off x="8101412" y="5569950"/>
+            <a:ext cx="520657" cy="1796"/>
           </a:xfrm>
           <a:prstGeom prst="bentConnector3">
             <a:avLst>
@@ -7399,8 +7404,8 @@
         </p:nvSpPr>
         <p:spPr>
           <a:xfrm>
-            <a:off x="8726497" y="5795538"/>
-            <a:ext cx="1027103" cy="285783"/>
+            <a:off x="8625244" y="5795538"/>
+            <a:ext cx="1027103" cy="259803"/>
           </a:xfrm>
           <a:prstGeom prst="rect">
             <a:avLst/>
@@ -7465,8 +7470,8 @@
         </p:nvCxnSpPr>
         <p:spPr>
           <a:xfrm>
-            <a:off x="8185901" y="5571746"/>
-            <a:ext cx="540596" cy="366684"/>
+            <a:off x="8101412" y="5569950"/>
+            <a:ext cx="523832" cy="355490"/>
           </a:xfrm>
           <a:prstGeom prst="bentConnector3">
             <a:avLst>
@@ -7515,12 +7520,12 @@
         </p:nvCxnSpPr>
         <p:spPr>
           <a:xfrm rot="16200000" flipH="1">
-            <a:off x="3892537" y="2133777"/>
-            <a:ext cx="1939012" cy="5307354"/>
+            <a:off x="3845086" y="2181228"/>
+            <a:ext cx="1948448" cy="5221888"/>
           </a:xfrm>
           <a:prstGeom prst="bentConnector3">
             <a:avLst>
-              <a:gd name="adj1" fmla="val 137183"/>
+              <a:gd name="adj1" fmla="val 135197"/>
             </a:avLst>
           </a:prstGeom>
           <a:ln w="19050">
@@ -7562,7 +7567,965 @@
         </p:nvSpPr>
         <p:spPr>
           <a:xfrm rot="16200000">
-            <a:off x="7245028" y="6076101"/>
+            <a:off x="7168828" y="6076101"/>
+            <a:ext cx="881018" cy="261610"/>
+          </a:xfrm>
+          <a:prstGeom prst="rect">
+            <a:avLst/>
+          </a:prstGeom>
+          <a:noFill/>
+        </p:spPr>
+        <p:txBody>
+          <a:bodyPr wrap="square" rtlCol="0">
+            <a:spAutoFit/>
+          </a:bodyPr>
+          <a:lstStyle/>
+          <a:p>
+            <a:pPr algn="r"/>
+            <a:r>
+              <a:rPr lang="en-US" sz="1100" dirty="0">
+                <a:solidFill>
+                  <a:srgbClr val="7030A0"/>
+                </a:solidFill>
+              </a:rPr>
+              <a:t>filtered list</a:t>
+            </a:r>
+            <a:endParaRPr lang="en-SG" sz="1100" dirty="0">
+              <a:solidFill>
+                <a:srgbClr val="7030A0"/>
+              </a:solidFill>
+            </a:endParaRPr>
+          </a:p>
+        </p:txBody>
+      </p:sp>
+      <p:sp>
+        <p:nvSpPr>
+          <p:cNvPr id="96" name="Rectangle 8">
+            <a:extLst>
+              <a:ext uri="{FF2B5EF4-FFF2-40B4-BE49-F238E27FC236}">
+                <a16:creationId xmlns:a16="http://schemas.microsoft.com/office/drawing/2014/main" id="{43650A4F-5460-436D-8AB0-AC5B1B26943D}"/>
+              </a:ext>
+            </a:extLst>
+          </p:cNvPr>
+          <p:cNvSpPr/>
+          <p:nvPr/>
+        </p:nvSpPr>
+        <p:spPr>
+          <a:xfrm>
+            <a:off x="5125058" y="6781800"/>
+            <a:ext cx="1407643" cy="346760"/>
+          </a:xfrm>
+          <a:prstGeom prst="rect">
+            <a:avLst/>
+          </a:prstGeom>
+          <a:ln w="19050">
+            <a:solidFill>
+              <a:srgbClr val="7030A0"/>
+            </a:solidFill>
+          </a:ln>
+          <a:effectLst/>
+        </p:spPr>
+        <p:style>
+          <a:lnRef idx="1">
+            <a:schemeClr val="accent4"/>
+          </a:lnRef>
+          <a:fillRef idx="2">
+            <a:schemeClr val="accent4"/>
+          </a:fillRef>
+          <a:effectRef idx="1">
+            <a:schemeClr val="accent4"/>
+          </a:effectRef>
+          <a:fontRef idx="minor">
+            <a:schemeClr val="dk1"/>
+          </a:fontRef>
+        </p:style>
+        <p:txBody>
+          <a:bodyPr rtlCol="0" anchor="ctr"/>
+          <a:lstStyle/>
+          <a:p>
+            <a:pPr algn="ctr"/>
+            <a:r>
+              <a:rPr lang="en-US" sz="1050" dirty="0" err="1">
+                <a:solidFill>
+                  <a:srgbClr val="7030A0"/>
+                </a:solidFill>
+              </a:rPr>
+              <a:t>UniqueRecordList</a:t>
+            </a:r>
+            <a:endParaRPr lang="en-SG" sz="1050" dirty="0">
+              <a:solidFill>
+                <a:srgbClr val="7030A0"/>
+              </a:solidFill>
+            </a:endParaRPr>
+          </a:p>
+        </p:txBody>
+      </p:sp>
+      <p:sp>
+        <p:nvSpPr>
+          <p:cNvPr id="99" name="Flowchart: Decision 96">
+            <a:extLst>
+              <a:ext uri="{FF2B5EF4-FFF2-40B4-BE49-F238E27FC236}">
+                <a16:creationId xmlns:a16="http://schemas.microsoft.com/office/drawing/2014/main" id="{40008E06-7B74-4A07-9C07-02CD8E6E9904}"/>
+              </a:ext>
+            </a:extLst>
+          </p:cNvPr>
+          <p:cNvSpPr/>
+          <p:nvPr/>
+        </p:nvSpPr>
+        <p:spPr>
+          <a:xfrm>
+            <a:off x="6541742" y="6858000"/>
+            <a:ext cx="236048" cy="173380"/>
+          </a:xfrm>
+          <a:prstGeom prst="flowChartDecision">
+            <a:avLst/>
+          </a:prstGeom>
+          <a:noFill/>
+          <a:ln w="19050">
+            <a:solidFill>
+              <a:srgbClr val="7030A0"/>
+            </a:solidFill>
+          </a:ln>
+          <a:effectLst/>
+        </p:spPr>
+        <p:style>
+          <a:lnRef idx="1">
+            <a:schemeClr val="accent6"/>
+          </a:lnRef>
+          <a:fillRef idx="2">
+            <a:schemeClr val="accent6"/>
+          </a:fillRef>
+          <a:effectRef idx="1">
+            <a:schemeClr val="accent6"/>
+          </a:effectRef>
+          <a:fontRef idx="minor">
+            <a:schemeClr val="dk1"/>
+          </a:fontRef>
+        </p:style>
+        <p:txBody>
+          <a:bodyPr rtlCol="0" anchor="ctr"/>
+          <a:lstStyle/>
+          <a:p>
+            <a:pPr algn="ctr"/>
+            <a:endParaRPr lang="en-US" sz="1050"/>
+          </a:p>
+        </p:txBody>
+      </p:sp>
+      <p:cxnSp>
+        <p:nvCxnSpPr>
+          <p:cNvPr id="100" name="Elbow Connector 63">
+            <a:extLst>
+              <a:ext uri="{FF2B5EF4-FFF2-40B4-BE49-F238E27FC236}">
+                <a16:creationId xmlns:a16="http://schemas.microsoft.com/office/drawing/2014/main" id="{D40006A0-5C36-4899-ACE5-0FC11D90CE89}"/>
+              </a:ext>
+            </a:extLst>
+          </p:cNvPr>
+          <p:cNvCxnSpPr>
+            <a:cxnSpLocks/>
+            <a:stCxn id="99" idx="3"/>
+            <a:endCxn id="144" idx="1"/>
+          </p:cNvCxnSpPr>
+          <p:nvPr/>
+        </p:nvCxnSpPr>
+        <p:spPr>
+          <a:xfrm flipV="1">
+            <a:off x="6777790" y="6944208"/>
+            <a:ext cx="227935" cy="482"/>
+          </a:xfrm>
+          <a:prstGeom prst="bentConnector3">
+            <a:avLst/>
+          </a:prstGeom>
+          <a:ln w="19050">
+            <a:solidFill>
+              <a:srgbClr val="7030A0"/>
+            </a:solidFill>
+            <a:headEnd type="none" w="med" len="med"/>
+            <a:tailEnd type="arrow" w="med" len="med"/>
+          </a:ln>
+          <a:effectLst/>
+        </p:spPr>
+        <p:style>
+          <a:lnRef idx="1">
+            <a:schemeClr val="accent2"/>
+          </a:lnRef>
+          <a:fillRef idx="2">
+            <a:schemeClr val="accent2"/>
+          </a:fillRef>
+          <a:effectRef idx="1">
+            <a:schemeClr val="accent2"/>
+          </a:effectRef>
+          <a:fontRef idx="minor">
+            <a:schemeClr val="dk1"/>
+          </a:fontRef>
+        </p:style>
+      </p:cxnSp>
+      <p:sp>
+        <p:nvSpPr>
+          <p:cNvPr id="141" name="TextBox 140">
+            <a:extLst>
+              <a:ext uri="{FF2B5EF4-FFF2-40B4-BE49-F238E27FC236}">
+                <a16:creationId xmlns:a16="http://schemas.microsoft.com/office/drawing/2014/main" id="{7F13261A-11AF-4B4C-9BDF-2D768E1662A0}"/>
+              </a:ext>
+            </a:extLst>
+          </p:cNvPr>
+          <p:cNvSpPr txBox="1"/>
+          <p:nvPr/>
+        </p:nvSpPr>
+        <p:spPr>
+          <a:xfrm>
+            <a:off x="6758538" y="7014852"/>
+            <a:ext cx="189257" cy="178683"/>
+          </a:xfrm>
+          <a:prstGeom prst="rect">
+            <a:avLst/>
+          </a:prstGeom>
+          <a:noFill/>
+        </p:spPr>
+        <p:txBody>
+          <a:bodyPr wrap="square" lIns="0" tIns="0" rIns="0" bIns="0" rtlCol="0">
+            <a:noAutofit/>
+          </a:bodyPr>
+          <a:lstStyle/>
+          <a:p>
+            <a:pPr algn="ctr"/>
+            <a:r>
+              <a:rPr lang="en-US" sz="1100" dirty="0">
+                <a:solidFill>
+                  <a:srgbClr val="7030A0"/>
+                </a:solidFill>
+              </a:rPr>
+              <a:t>*</a:t>
+            </a:r>
+            <a:endParaRPr lang="en-SG" sz="1100" dirty="0">
+              <a:solidFill>
+                <a:srgbClr val="7030A0"/>
+              </a:solidFill>
+            </a:endParaRPr>
+          </a:p>
+        </p:txBody>
+      </p:sp>
+      <p:cxnSp>
+        <p:nvCxnSpPr>
+          <p:cNvPr id="142" name="Elbow Connector 29">
+            <a:extLst>
+              <a:ext uri="{FF2B5EF4-FFF2-40B4-BE49-F238E27FC236}">
+                <a16:creationId xmlns:a16="http://schemas.microsoft.com/office/drawing/2014/main" id="{3DCEEBCD-984E-42AA-BC38-EF56AF2A2C79}"/>
+              </a:ext>
+            </a:extLst>
+          </p:cNvPr>
+          <p:cNvCxnSpPr>
+            <a:cxnSpLocks/>
+            <a:stCxn id="51" idx="2"/>
+            <a:endCxn id="96" idx="1"/>
+          </p:cNvCxnSpPr>
+          <p:nvPr/>
+        </p:nvCxnSpPr>
+        <p:spPr>
+          <a:xfrm rot="16200000" flipH="1">
+            <a:off x="3007897" y="4838018"/>
+            <a:ext cx="3823415" cy="410908"/>
+          </a:xfrm>
+          <a:prstGeom prst="bentConnector2">
+            <a:avLst/>
+          </a:prstGeom>
+          <a:ln w="19050">
+            <a:solidFill>
+              <a:srgbClr val="7030A0"/>
+            </a:solidFill>
+            <a:headEnd type="none" w="med" len="med"/>
+            <a:tailEnd type="arrow" w="med" len="med"/>
+          </a:ln>
+          <a:effectLst/>
+        </p:spPr>
+        <p:style>
+          <a:lnRef idx="1">
+            <a:schemeClr val="accent2"/>
+          </a:lnRef>
+          <a:fillRef idx="2">
+            <a:schemeClr val="accent2"/>
+          </a:fillRef>
+          <a:effectRef idx="1">
+            <a:schemeClr val="accent2"/>
+          </a:effectRef>
+          <a:fontRef idx="minor">
+            <a:schemeClr val="dk1"/>
+          </a:fontRef>
+        </p:style>
+      </p:cxnSp>
+      <p:sp>
+        <p:nvSpPr>
+          <p:cNvPr id="143" name="TextBox 142">
+            <a:extLst>
+              <a:ext uri="{FF2B5EF4-FFF2-40B4-BE49-F238E27FC236}">
+                <a16:creationId xmlns:a16="http://schemas.microsoft.com/office/drawing/2014/main" id="{35093599-B338-4435-8827-F6D2BED28501}"/>
+              </a:ext>
+            </a:extLst>
+          </p:cNvPr>
+          <p:cNvSpPr txBox="1"/>
+          <p:nvPr/>
+        </p:nvSpPr>
+        <p:spPr>
+          <a:xfrm>
+            <a:off x="4845694" y="6679317"/>
+            <a:ext cx="189257" cy="178683"/>
+          </a:xfrm>
+          <a:prstGeom prst="rect">
+            <a:avLst/>
+          </a:prstGeom>
+          <a:noFill/>
+        </p:spPr>
+        <p:txBody>
+          <a:bodyPr wrap="square" lIns="0" tIns="0" rIns="0" bIns="0" rtlCol="0">
+            <a:noAutofit/>
+          </a:bodyPr>
+          <a:lstStyle/>
+          <a:p>
+            <a:pPr algn="ctr"/>
+            <a:r>
+              <a:rPr lang="en-US" sz="1100" dirty="0">
+                <a:solidFill>
+                  <a:srgbClr val="7030A0"/>
+                </a:solidFill>
+              </a:rPr>
+              <a:t>1</a:t>
+            </a:r>
+            <a:endParaRPr lang="en-SG" sz="1100" dirty="0">
+              <a:solidFill>
+                <a:srgbClr val="7030A0"/>
+              </a:solidFill>
+            </a:endParaRPr>
+          </a:p>
+        </p:txBody>
+      </p:sp>
+      <p:sp>
+        <p:nvSpPr>
+          <p:cNvPr id="144" name="Rectangle 8">
+            <a:extLst>
+              <a:ext uri="{FF2B5EF4-FFF2-40B4-BE49-F238E27FC236}">
+                <a16:creationId xmlns:a16="http://schemas.microsoft.com/office/drawing/2014/main" id="{2BFDA812-F9FB-4BBC-9933-498C3AF44660}"/>
+              </a:ext>
+            </a:extLst>
+          </p:cNvPr>
+          <p:cNvSpPr/>
+          <p:nvPr/>
+        </p:nvSpPr>
+        <p:spPr>
+          <a:xfrm>
+            <a:off x="7005725" y="6770828"/>
+            <a:ext cx="850913" cy="346760"/>
+          </a:xfrm>
+          <a:prstGeom prst="rect">
+            <a:avLst/>
+          </a:prstGeom>
+          <a:ln w="19050">
+            <a:solidFill>
+              <a:srgbClr val="7030A0"/>
+            </a:solidFill>
+          </a:ln>
+          <a:effectLst/>
+        </p:spPr>
+        <p:style>
+          <a:lnRef idx="1">
+            <a:schemeClr val="accent4"/>
+          </a:lnRef>
+          <a:fillRef idx="2">
+            <a:schemeClr val="accent4"/>
+          </a:fillRef>
+          <a:effectRef idx="1">
+            <a:schemeClr val="accent4"/>
+          </a:effectRef>
+          <a:fontRef idx="minor">
+            <a:schemeClr val="dk1"/>
+          </a:fontRef>
+        </p:style>
+        <p:txBody>
+          <a:bodyPr rtlCol="0" anchor="ctr"/>
+          <a:lstStyle/>
+          <a:p>
+            <a:pPr algn="ctr"/>
+            <a:r>
+              <a:rPr lang="en-US" sz="1050" dirty="0" err="1">
+                <a:solidFill>
+                  <a:srgbClr val="7030A0"/>
+                </a:solidFill>
+              </a:rPr>
+              <a:t>SalesRecord</a:t>
+            </a:r>
+            <a:endParaRPr lang="en-SG" sz="1050" dirty="0">
+              <a:solidFill>
+                <a:srgbClr val="7030A0"/>
+              </a:solidFill>
+            </a:endParaRPr>
+          </a:p>
+        </p:txBody>
+      </p:sp>
+      <p:sp>
+        <p:nvSpPr>
+          <p:cNvPr id="145" name="Rectangle 8">
+            <a:extLst>
+              <a:ext uri="{FF2B5EF4-FFF2-40B4-BE49-F238E27FC236}">
+                <a16:creationId xmlns:a16="http://schemas.microsoft.com/office/drawing/2014/main" id="{EAE1E66E-3676-4A05-9B43-117FC0026EE0}"/>
+              </a:ext>
+            </a:extLst>
+          </p:cNvPr>
+          <p:cNvSpPr/>
+          <p:nvPr/>
+        </p:nvSpPr>
+        <p:spPr>
+          <a:xfrm>
+            <a:off x="8604471" y="6366444"/>
+            <a:ext cx="891955" cy="285783"/>
+          </a:xfrm>
+          <a:prstGeom prst="rect">
+            <a:avLst/>
+          </a:prstGeom>
+          <a:ln w="19050">
+            <a:solidFill>
+              <a:srgbClr val="7030A0"/>
+            </a:solidFill>
+          </a:ln>
+          <a:effectLst/>
+        </p:spPr>
+        <p:style>
+          <a:lnRef idx="1">
+            <a:schemeClr val="accent4"/>
+          </a:lnRef>
+          <a:fillRef idx="2">
+            <a:schemeClr val="accent4"/>
+          </a:fillRef>
+          <a:effectRef idx="1">
+            <a:schemeClr val="accent4"/>
+          </a:effectRef>
+          <a:fontRef idx="minor">
+            <a:schemeClr val="dk1"/>
+          </a:fontRef>
+        </p:style>
+        <p:txBody>
+          <a:bodyPr rtlCol="0" anchor="ctr"/>
+          <a:lstStyle/>
+          <a:p>
+            <a:pPr algn="ctr"/>
+            <a:r>
+              <a:rPr lang="en-US" sz="1050" dirty="0">
+                <a:solidFill>
+                  <a:srgbClr val="7030A0"/>
+                </a:solidFill>
+              </a:rPr>
+              <a:t>Date</a:t>
+            </a:r>
+            <a:endParaRPr lang="en-SG" sz="1050" dirty="0">
+              <a:solidFill>
+                <a:srgbClr val="7030A0"/>
+              </a:solidFill>
+            </a:endParaRPr>
+          </a:p>
+        </p:txBody>
+      </p:sp>
+      <p:cxnSp>
+        <p:nvCxnSpPr>
+          <p:cNvPr id="146" name="Elbow Connector 78">
+            <a:extLst>
+              <a:ext uri="{FF2B5EF4-FFF2-40B4-BE49-F238E27FC236}">
+                <a16:creationId xmlns:a16="http://schemas.microsoft.com/office/drawing/2014/main" id="{C1B07096-F38D-429B-85A0-960EC0B7DD86}"/>
+              </a:ext>
+            </a:extLst>
+          </p:cNvPr>
+          <p:cNvCxnSpPr>
+            <a:cxnSpLocks/>
+            <a:stCxn id="152" idx="3"/>
+            <a:endCxn id="145" idx="1"/>
+          </p:cNvCxnSpPr>
+          <p:nvPr/>
+        </p:nvCxnSpPr>
+        <p:spPr>
+          <a:xfrm flipV="1">
+            <a:off x="8106185" y="6509336"/>
+            <a:ext cx="498286" cy="446286"/>
+          </a:xfrm>
+          <a:prstGeom prst="bentConnector3">
+            <a:avLst>
+              <a:gd name="adj1" fmla="val 50000"/>
+            </a:avLst>
+          </a:prstGeom>
+          <a:ln w="19050">
+            <a:solidFill>
+              <a:srgbClr val="7030A0"/>
+            </a:solidFill>
+            <a:headEnd type="none" w="med" len="med"/>
+            <a:tailEnd type="arrow" w="med" len="med"/>
+          </a:ln>
+          <a:effectLst/>
+        </p:spPr>
+        <p:style>
+          <a:lnRef idx="1">
+            <a:schemeClr val="accent2"/>
+          </a:lnRef>
+          <a:fillRef idx="2">
+            <a:schemeClr val="accent2"/>
+          </a:fillRef>
+          <a:effectRef idx="1">
+            <a:schemeClr val="accent2"/>
+          </a:effectRef>
+          <a:fontRef idx="minor">
+            <a:schemeClr val="dk1"/>
+          </a:fontRef>
+        </p:style>
+      </p:cxnSp>
+      <p:sp>
+        <p:nvSpPr>
+          <p:cNvPr id="147" name="Rectangle 8">
+            <a:extLst>
+              <a:ext uri="{FF2B5EF4-FFF2-40B4-BE49-F238E27FC236}">
+                <a16:creationId xmlns:a16="http://schemas.microsoft.com/office/drawing/2014/main" id="{44552C90-5C43-420C-8AE0-1063DDBF2DB4}"/>
+              </a:ext>
+            </a:extLst>
+          </p:cNvPr>
+          <p:cNvSpPr/>
+          <p:nvPr/>
+        </p:nvSpPr>
+        <p:spPr>
+          <a:xfrm>
+            <a:off x="8604471" y="6689422"/>
+            <a:ext cx="891955" cy="285783"/>
+          </a:xfrm>
+          <a:prstGeom prst="rect">
+            <a:avLst/>
+          </a:prstGeom>
+          <a:ln w="19050">
+            <a:solidFill>
+              <a:srgbClr val="7030A0"/>
+            </a:solidFill>
+          </a:ln>
+          <a:effectLst/>
+        </p:spPr>
+        <p:style>
+          <a:lnRef idx="1">
+            <a:schemeClr val="accent4"/>
+          </a:lnRef>
+          <a:fillRef idx="2">
+            <a:schemeClr val="accent4"/>
+          </a:fillRef>
+          <a:effectRef idx="1">
+            <a:schemeClr val="accent4"/>
+          </a:effectRef>
+          <a:fontRef idx="minor">
+            <a:schemeClr val="dk1"/>
+          </a:fontRef>
+        </p:style>
+        <p:txBody>
+          <a:bodyPr rtlCol="0" anchor="ctr"/>
+          <a:lstStyle/>
+          <a:p>
+            <a:pPr algn="ctr"/>
+            <a:r>
+              <a:rPr lang="en-US" sz="1050" dirty="0" err="1">
+                <a:solidFill>
+                  <a:srgbClr val="7030A0"/>
+                </a:solidFill>
+              </a:rPr>
+              <a:t>ItemName</a:t>
+            </a:r>
+            <a:endParaRPr lang="en-SG" sz="1050" dirty="0">
+              <a:solidFill>
+                <a:srgbClr val="7030A0"/>
+              </a:solidFill>
+            </a:endParaRPr>
+          </a:p>
+        </p:txBody>
+      </p:sp>
+      <p:sp>
+        <p:nvSpPr>
+          <p:cNvPr id="148" name="Rectangle 8">
+            <a:extLst>
+              <a:ext uri="{FF2B5EF4-FFF2-40B4-BE49-F238E27FC236}">
+                <a16:creationId xmlns:a16="http://schemas.microsoft.com/office/drawing/2014/main" id="{A5877C28-05FE-459B-9F8F-571E5B956837}"/>
+              </a:ext>
+            </a:extLst>
+          </p:cNvPr>
+          <p:cNvSpPr/>
+          <p:nvPr/>
+        </p:nvSpPr>
+        <p:spPr>
+          <a:xfrm>
+            <a:off x="8604470" y="7007032"/>
+            <a:ext cx="891955" cy="285783"/>
+          </a:xfrm>
+          <a:prstGeom prst="rect">
+            <a:avLst/>
+          </a:prstGeom>
+          <a:ln w="19050">
+            <a:solidFill>
+              <a:srgbClr val="7030A0"/>
+            </a:solidFill>
+          </a:ln>
+          <a:effectLst/>
+        </p:spPr>
+        <p:style>
+          <a:lnRef idx="1">
+            <a:schemeClr val="accent4"/>
+          </a:lnRef>
+          <a:fillRef idx="2">
+            <a:schemeClr val="accent4"/>
+          </a:fillRef>
+          <a:effectRef idx="1">
+            <a:schemeClr val="accent4"/>
+          </a:effectRef>
+          <a:fontRef idx="minor">
+            <a:schemeClr val="dk1"/>
+          </a:fontRef>
+        </p:style>
+        <p:txBody>
+          <a:bodyPr rtlCol="0" anchor="ctr"/>
+          <a:lstStyle/>
+          <a:p>
+            <a:pPr algn="ctr"/>
+            <a:r>
+              <a:rPr lang="en-US" sz="1050" dirty="0" err="1">
+                <a:solidFill>
+                  <a:srgbClr val="7030A0"/>
+                </a:solidFill>
+              </a:rPr>
+              <a:t>QuantitySold</a:t>
+            </a:r>
+            <a:endParaRPr lang="en-SG" sz="1050" dirty="0">
+              <a:solidFill>
+                <a:srgbClr val="7030A0"/>
+              </a:solidFill>
+            </a:endParaRPr>
+          </a:p>
+        </p:txBody>
+      </p:sp>
+      <p:sp>
+        <p:nvSpPr>
+          <p:cNvPr id="149" name="Rectangle 8">
+            <a:extLst>
+              <a:ext uri="{FF2B5EF4-FFF2-40B4-BE49-F238E27FC236}">
+                <a16:creationId xmlns:a16="http://schemas.microsoft.com/office/drawing/2014/main" id="{DB88D535-E00D-4CF4-BBCE-50D3FBEDE167}"/>
+              </a:ext>
+            </a:extLst>
+          </p:cNvPr>
+          <p:cNvSpPr/>
+          <p:nvPr/>
+        </p:nvSpPr>
+        <p:spPr>
+          <a:xfrm>
+            <a:off x="8604470" y="7339908"/>
+            <a:ext cx="891955" cy="285783"/>
+          </a:xfrm>
+          <a:prstGeom prst="rect">
+            <a:avLst/>
+          </a:prstGeom>
+          <a:ln w="19050">
+            <a:solidFill>
+              <a:srgbClr val="7030A0"/>
+            </a:solidFill>
+          </a:ln>
+          <a:effectLst/>
+        </p:spPr>
+        <p:style>
+          <a:lnRef idx="1">
+            <a:schemeClr val="accent4"/>
+          </a:lnRef>
+          <a:fillRef idx="2">
+            <a:schemeClr val="accent4"/>
+          </a:fillRef>
+          <a:effectRef idx="1">
+            <a:schemeClr val="accent4"/>
+          </a:effectRef>
+          <a:fontRef idx="minor">
+            <a:schemeClr val="dk1"/>
+          </a:fontRef>
+        </p:style>
+        <p:txBody>
+          <a:bodyPr rtlCol="0" anchor="ctr"/>
+          <a:lstStyle/>
+          <a:p>
+            <a:pPr algn="ctr"/>
+            <a:r>
+              <a:rPr lang="en-US" sz="1050" dirty="0">
+                <a:solidFill>
+                  <a:srgbClr val="7030A0"/>
+                </a:solidFill>
+              </a:rPr>
+              <a:t>Price</a:t>
+            </a:r>
+            <a:endParaRPr lang="en-SG" sz="1050" dirty="0">
+              <a:solidFill>
+                <a:srgbClr val="7030A0"/>
+              </a:solidFill>
+            </a:endParaRPr>
+          </a:p>
+        </p:txBody>
+      </p:sp>
+      <p:cxnSp>
+        <p:nvCxnSpPr>
+          <p:cNvPr id="150" name="Elbow Connector 78">
+            <a:extLst>
+              <a:ext uri="{FF2B5EF4-FFF2-40B4-BE49-F238E27FC236}">
+                <a16:creationId xmlns:a16="http://schemas.microsoft.com/office/drawing/2014/main" id="{DC56F46F-C820-4CDF-9B25-B84AE6948A72}"/>
+              </a:ext>
+            </a:extLst>
+          </p:cNvPr>
+          <p:cNvCxnSpPr>
+            <a:cxnSpLocks/>
+            <a:stCxn id="152" idx="3"/>
+            <a:endCxn id="149" idx="1"/>
+          </p:cNvCxnSpPr>
+          <p:nvPr/>
+        </p:nvCxnSpPr>
+        <p:spPr>
+          <a:xfrm>
+            <a:off x="8106185" y="6955622"/>
+            <a:ext cx="498285" cy="527178"/>
+          </a:xfrm>
+          <a:prstGeom prst="bentConnector3">
+            <a:avLst>
+              <a:gd name="adj1" fmla="val 50000"/>
+            </a:avLst>
+          </a:prstGeom>
+          <a:ln w="19050">
+            <a:solidFill>
+              <a:srgbClr val="7030A0"/>
+            </a:solidFill>
+            <a:headEnd type="none" w="med" len="med"/>
+            <a:tailEnd type="arrow" w="med" len="med"/>
+          </a:ln>
+          <a:effectLst/>
+        </p:spPr>
+        <p:style>
+          <a:lnRef idx="1">
+            <a:schemeClr val="accent2"/>
+          </a:lnRef>
+          <a:fillRef idx="2">
+            <a:schemeClr val="accent2"/>
+          </a:fillRef>
+          <a:effectRef idx="1">
+            <a:schemeClr val="accent2"/>
+          </a:effectRef>
+          <a:fontRef idx="minor">
+            <a:schemeClr val="dk1"/>
+          </a:fontRef>
+        </p:style>
+      </p:cxnSp>
+      <p:sp>
+        <p:nvSpPr>
+          <p:cNvPr id="152" name="Flowchart: Decision 96">
+            <a:extLst>
+              <a:ext uri="{FF2B5EF4-FFF2-40B4-BE49-F238E27FC236}">
+                <a16:creationId xmlns:a16="http://schemas.microsoft.com/office/drawing/2014/main" id="{DD0CF0B3-6715-4241-AFAC-D1601EE75E84}"/>
+              </a:ext>
+            </a:extLst>
+          </p:cNvPr>
+          <p:cNvSpPr/>
+          <p:nvPr/>
+        </p:nvSpPr>
+        <p:spPr>
+          <a:xfrm>
+            <a:off x="7870137" y="6868932"/>
+            <a:ext cx="236048" cy="173380"/>
+          </a:xfrm>
+          <a:prstGeom prst="flowChartDecision">
+            <a:avLst/>
+          </a:prstGeom>
+          <a:solidFill>
+            <a:srgbClr val="7030A0"/>
+          </a:solidFill>
+          <a:ln w="19050">
+            <a:solidFill>
+              <a:srgbClr val="7030A0"/>
+            </a:solidFill>
+          </a:ln>
+          <a:effectLst/>
+        </p:spPr>
+        <p:style>
+          <a:lnRef idx="1">
+            <a:schemeClr val="accent6"/>
+          </a:lnRef>
+          <a:fillRef idx="2">
+            <a:schemeClr val="accent6"/>
+          </a:fillRef>
+          <a:effectRef idx="1">
+            <a:schemeClr val="accent6"/>
+          </a:effectRef>
+          <a:fontRef idx="minor">
+            <a:schemeClr val="dk1"/>
+          </a:fontRef>
+        </p:style>
+        <p:txBody>
+          <a:bodyPr rtlCol="0" anchor="ctr"/>
+          <a:lstStyle/>
+          <a:p>
+            <a:pPr algn="ctr"/>
+            <a:endParaRPr lang="en-US" sz="1050"/>
+          </a:p>
+        </p:txBody>
+      </p:sp>
+      <p:cxnSp>
+        <p:nvCxnSpPr>
+          <p:cNvPr id="153" name="Elbow Connector 78">
+            <a:extLst>
+              <a:ext uri="{FF2B5EF4-FFF2-40B4-BE49-F238E27FC236}">
+                <a16:creationId xmlns:a16="http://schemas.microsoft.com/office/drawing/2014/main" id="{0FAF2DC7-CE96-4585-BEFE-A1B691A02235}"/>
+              </a:ext>
+            </a:extLst>
+          </p:cNvPr>
+          <p:cNvCxnSpPr>
+            <a:cxnSpLocks/>
+            <a:stCxn id="152" idx="3"/>
+            <a:endCxn id="148" idx="1"/>
+          </p:cNvCxnSpPr>
+          <p:nvPr/>
+        </p:nvCxnSpPr>
+        <p:spPr>
+          <a:xfrm>
+            <a:off x="8106185" y="6955622"/>
+            <a:ext cx="498285" cy="194302"/>
+          </a:xfrm>
+          <a:prstGeom prst="bentConnector3">
+            <a:avLst>
+              <a:gd name="adj1" fmla="val 50000"/>
+            </a:avLst>
+          </a:prstGeom>
+          <a:ln w="19050">
+            <a:solidFill>
+              <a:srgbClr val="7030A0"/>
+            </a:solidFill>
+            <a:headEnd type="none" w="med" len="med"/>
+            <a:tailEnd type="arrow" w="med" len="med"/>
+          </a:ln>
+          <a:effectLst/>
+        </p:spPr>
+        <p:style>
+          <a:lnRef idx="1">
+            <a:schemeClr val="accent2"/>
+          </a:lnRef>
+          <a:fillRef idx="2">
+            <a:schemeClr val="accent2"/>
+          </a:fillRef>
+          <a:effectRef idx="1">
+            <a:schemeClr val="accent2"/>
+          </a:effectRef>
+          <a:fontRef idx="minor">
+            <a:schemeClr val="dk1"/>
+          </a:fontRef>
+        </p:style>
+      </p:cxnSp>
+      <p:cxnSp>
+        <p:nvCxnSpPr>
+          <p:cNvPr id="154" name="Elbow Connector 78">
+            <a:extLst>
+              <a:ext uri="{FF2B5EF4-FFF2-40B4-BE49-F238E27FC236}">
+                <a16:creationId xmlns:a16="http://schemas.microsoft.com/office/drawing/2014/main" id="{3130E058-182E-4F1D-8905-72A00FD67897}"/>
+              </a:ext>
+            </a:extLst>
+          </p:cNvPr>
+          <p:cNvCxnSpPr>
+            <a:cxnSpLocks/>
+            <a:stCxn id="152" idx="3"/>
+            <a:endCxn id="147" idx="1"/>
+          </p:cNvCxnSpPr>
+          <p:nvPr/>
+        </p:nvCxnSpPr>
+        <p:spPr>
+          <a:xfrm flipV="1">
+            <a:off x="8106185" y="6832314"/>
+            <a:ext cx="498286" cy="123308"/>
+          </a:xfrm>
+          <a:prstGeom prst="bentConnector3">
+            <a:avLst>
+              <a:gd name="adj1" fmla="val 50000"/>
+            </a:avLst>
+          </a:prstGeom>
+          <a:ln w="19050">
+            <a:solidFill>
+              <a:srgbClr val="7030A0"/>
+            </a:solidFill>
+            <a:headEnd type="none" w="med" len="med"/>
+            <a:tailEnd type="arrow" w="med" len="med"/>
+          </a:ln>
+          <a:effectLst/>
+        </p:spPr>
+        <p:style>
+          <a:lnRef idx="1">
+            <a:schemeClr val="accent2"/>
+          </a:lnRef>
+          <a:fillRef idx="2">
+            <a:schemeClr val="accent2"/>
+          </a:fillRef>
+          <a:effectRef idx="1">
+            <a:schemeClr val="accent2"/>
+          </a:effectRef>
+          <a:fontRef idx="minor">
+            <a:schemeClr val="dk1"/>
+          </a:fontRef>
+        </p:style>
+      </p:cxnSp>
+      <p:cxnSp>
+        <p:nvCxnSpPr>
+          <p:cNvPr id="155" name="Elbow Connector 106">
+            <a:extLst>
+              <a:ext uri="{FF2B5EF4-FFF2-40B4-BE49-F238E27FC236}">
+                <a16:creationId xmlns:a16="http://schemas.microsoft.com/office/drawing/2014/main" id="{82A471C0-6DD3-409A-8F29-DC8A4B873547}"/>
+              </a:ext>
+            </a:extLst>
+          </p:cNvPr>
+          <p:cNvCxnSpPr>
+            <a:cxnSpLocks/>
+            <a:stCxn id="9" idx="1"/>
+            <a:endCxn id="144" idx="2"/>
+          </p:cNvCxnSpPr>
+          <p:nvPr/>
+        </p:nvCxnSpPr>
+        <p:spPr>
+          <a:xfrm rot="16200000" flipH="1">
+            <a:off x="3169954" y="2856360"/>
+            <a:ext cx="3299640" cy="5222816"/>
+          </a:xfrm>
+          <a:prstGeom prst="bentConnector3">
+            <a:avLst>
+              <a:gd name="adj1" fmla="val 120014"/>
+            </a:avLst>
+          </a:prstGeom>
+          <a:ln w="19050">
+            <a:solidFill>
+              <a:srgbClr val="7030A0"/>
+            </a:solidFill>
+            <a:prstDash val="solid"/>
+            <a:headEnd type="none" w="med" len="med"/>
+            <a:tailEnd type="arrow" w="med" len="med"/>
+          </a:ln>
+          <a:effectLst/>
+        </p:spPr>
+        <p:style>
+          <a:lnRef idx="1">
+            <a:schemeClr val="accent2"/>
+          </a:lnRef>
+          <a:fillRef idx="2">
+            <a:schemeClr val="accent2"/>
+          </a:fillRef>
+          <a:effectRef idx="1">
+            <a:schemeClr val="accent2"/>
+          </a:effectRef>
+          <a:fontRef idx="minor">
+            <a:schemeClr val="dk1"/>
+          </a:fontRef>
+        </p:style>
+      </p:cxnSp>
+      <p:sp>
+        <p:nvSpPr>
+          <p:cNvPr id="156" name="TextBox 155">
+            <a:extLst>
+              <a:ext uri="{FF2B5EF4-FFF2-40B4-BE49-F238E27FC236}">
+                <a16:creationId xmlns:a16="http://schemas.microsoft.com/office/drawing/2014/main" id="{9422CB7E-F8E3-45A3-BA8A-FEA4E0FB6C9A}"/>
+              </a:ext>
+            </a:extLst>
+          </p:cNvPr>
+          <p:cNvSpPr txBox="1"/>
+          <p:nvPr/>
+        </p:nvSpPr>
+        <p:spPr>
+          <a:xfrm rot="16200000">
+            <a:off x="7168829" y="7403568"/>
             <a:ext cx="881018" cy="261610"/>
           </a:xfrm>
           <a:prstGeom prst="rect">

</xml_diff>